<commit_message>
update database2020.05.11 and it's report
</commit_message>
<xml_diff>
--- a/report/Timeline.Report.pptx
+++ b/report/Timeline.Report.pptx
@@ -21,17 +21,20 @@
     <p:sldId id="261" r:id="rId15"/>
     <p:sldId id="305" r:id="rId16"/>
     <p:sldId id="262" r:id="rId17"/>
-    <p:sldId id="302" r:id="rId18"/>
-    <p:sldId id="291" r:id="rId19"/>
-    <p:sldId id="263" r:id="rId20"/>
-    <p:sldId id="264" r:id="rId21"/>
-    <p:sldId id="282" r:id="rId22"/>
-    <p:sldId id="301" r:id="rId23"/>
-    <p:sldId id="299" r:id="rId24"/>
-    <p:sldId id="293" r:id="rId25"/>
-    <p:sldId id="279" r:id="rId26"/>
-    <p:sldId id="280" r:id="rId27"/>
-    <p:sldId id="281" r:id="rId28"/>
+    <p:sldId id="306" r:id="rId18"/>
+    <p:sldId id="307" r:id="rId19"/>
+    <p:sldId id="308" r:id="rId20"/>
+    <p:sldId id="302" r:id="rId21"/>
+    <p:sldId id="291" r:id="rId22"/>
+    <p:sldId id="263" r:id="rId23"/>
+    <p:sldId id="264" r:id="rId24"/>
+    <p:sldId id="282" r:id="rId25"/>
+    <p:sldId id="301" r:id="rId26"/>
+    <p:sldId id="299" r:id="rId27"/>
+    <p:sldId id="293" r:id="rId28"/>
+    <p:sldId id="279" r:id="rId29"/>
+    <p:sldId id="280" r:id="rId30"/>
+    <p:sldId id="281" r:id="rId31"/>
   </p:sldIdLst>
   <p:sldSz cx="9144000" cy="6858000" type="screen4x3"/>
   <p:notesSz cx="6858000" cy="9144000"/>
@@ -315,7 +318,7 @@
             <a:fld id="{1D8BD707-D9CF-40AE-B4C6-C98DA3205C09}" type="datetimeFigureOut">
               <a:rPr lang="en-US" smtClean="0"/>
               <a:pPr/>
-              <a:t>5/8/2020</a:t>
+              <a:t>5/11/2020</a:t>
             </a:fld>
             <a:endParaRPr lang="en-US"/>
           </a:p>
@@ -482,7 +485,7 @@
             <a:fld id="{1D8BD707-D9CF-40AE-B4C6-C98DA3205C09}" type="datetimeFigureOut">
               <a:rPr lang="en-US" smtClean="0"/>
               <a:pPr/>
-              <a:t>5/8/2020</a:t>
+              <a:t>5/11/2020</a:t>
             </a:fld>
             <a:endParaRPr lang="en-US"/>
           </a:p>
@@ -659,7 +662,7 @@
             <a:fld id="{1D8BD707-D9CF-40AE-B4C6-C98DA3205C09}" type="datetimeFigureOut">
               <a:rPr lang="en-US" smtClean="0"/>
               <a:pPr/>
-              <a:t>5/8/2020</a:t>
+              <a:t>5/11/2020</a:t>
             </a:fld>
             <a:endParaRPr lang="en-US"/>
           </a:p>
@@ -826,7 +829,7 @@
             <a:fld id="{1D8BD707-D9CF-40AE-B4C6-C98DA3205C09}" type="datetimeFigureOut">
               <a:rPr lang="en-US" smtClean="0"/>
               <a:pPr/>
-              <a:t>5/8/2020</a:t>
+              <a:t>5/11/2020</a:t>
             </a:fld>
             <a:endParaRPr lang="en-US"/>
           </a:p>
@@ -1069,7 +1072,7 @@
             <a:fld id="{1D8BD707-D9CF-40AE-B4C6-C98DA3205C09}" type="datetimeFigureOut">
               <a:rPr lang="en-US" smtClean="0"/>
               <a:pPr/>
-              <a:t>5/8/2020</a:t>
+              <a:t>5/11/2020</a:t>
             </a:fld>
             <a:endParaRPr lang="en-US"/>
           </a:p>
@@ -1354,7 +1357,7 @@
             <a:fld id="{1D8BD707-D9CF-40AE-B4C6-C98DA3205C09}" type="datetimeFigureOut">
               <a:rPr lang="en-US" smtClean="0"/>
               <a:pPr/>
-              <a:t>5/8/2020</a:t>
+              <a:t>5/11/2020</a:t>
             </a:fld>
             <a:endParaRPr lang="en-US"/>
           </a:p>
@@ -1773,7 +1776,7 @@
             <a:fld id="{1D8BD707-D9CF-40AE-B4C6-C98DA3205C09}" type="datetimeFigureOut">
               <a:rPr lang="en-US" smtClean="0"/>
               <a:pPr/>
-              <a:t>5/8/2020</a:t>
+              <a:t>5/11/2020</a:t>
             </a:fld>
             <a:endParaRPr lang="en-US"/>
           </a:p>
@@ -1888,7 +1891,7 @@
             <a:fld id="{1D8BD707-D9CF-40AE-B4C6-C98DA3205C09}" type="datetimeFigureOut">
               <a:rPr lang="en-US" smtClean="0"/>
               <a:pPr/>
-              <a:t>5/8/2020</a:t>
+              <a:t>5/11/2020</a:t>
             </a:fld>
             <a:endParaRPr lang="en-US"/>
           </a:p>
@@ -1980,7 +1983,7 @@
             <a:fld id="{1D8BD707-D9CF-40AE-B4C6-C98DA3205C09}" type="datetimeFigureOut">
               <a:rPr lang="en-US" smtClean="0"/>
               <a:pPr/>
-              <a:t>5/8/2020</a:t>
+              <a:t>5/11/2020</a:t>
             </a:fld>
             <a:endParaRPr lang="en-US"/>
           </a:p>
@@ -2254,7 +2257,7 @@
             <a:fld id="{1D8BD707-D9CF-40AE-B4C6-C98DA3205C09}" type="datetimeFigureOut">
               <a:rPr lang="en-US" smtClean="0"/>
               <a:pPr/>
-              <a:t>5/8/2020</a:t>
+              <a:t>5/11/2020</a:t>
             </a:fld>
             <a:endParaRPr lang="en-US"/>
           </a:p>
@@ -2504,7 +2507,7 @@
             <a:fld id="{1D8BD707-D9CF-40AE-B4C6-C98DA3205C09}" type="datetimeFigureOut">
               <a:rPr lang="en-US" smtClean="0"/>
               <a:pPr/>
-              <a:t>5/8/2020</a:t>
+              <a:t>5/11/2020</a:t>
             </a:fld>
             <a:endParaRPr lang="en-US"/>
           </a:p>
@@ -2714,7 +2717,7 @@
             <a:fld id="{1D8BD707-D9CF-40AE-B4C6-C98DA3205C09}" type="datetimeFigureOut">
               <a:rPr lang="en-US" smtClean="0"/>
               <a:pPr/>
-              <a:t>5/8/2020</a:t>
+              <a:t>5/11/2020</a:t>
             </a:fld>
             <a:endParaRPr lang="en-US"/>
           </a:p>
@@ -4384,43 +4387,6 @@
           </a:p>
         </p:txBody>
       </p:sp>
-      <p:pic>
-        <p:nvPicPr>
-          <p:cNvPr id="4" name="Content Placeholder 3" descr="F:\thuc_tap\BLE\report\daynight\2020.04.10_cal_93.jpg"/>
-          <p:cNvPicPr>
-            <a:picLocks noGrp="1"/>
-          </p:cNvPicPr>
-          <p:nvPr>
-            <p:ph idx="1"/>
-          </p:nvPr>
-        </p:nvPicPr>
-        <p:blipFill>
-          <a:blip r:embed="rId2" cstate="print">
-            <a:extLst>
-              <a:ext uri="{28A0092B-C50C-407E-A947-70E740481C1C}">
-                <a14:useLocalDpi xmlns:a14="http://schemas.microsoft.com/office/drawing/2010/main" val="0"/>
-              </a:ext>
-            </a:extLst>
-          </a:blip>
-          <a:srcRect/>
-          <a:stretch>
-            <a:fillRect/>
-          </a:stretch>
-        </p:blipFill>
-        <p:spPr bwMode="auto">
-          <a:xfrm>
-            <a:off x="0" y="1143000"/>
-            <a:ext cx="9144000" cy="4648200"/>
-          </a:xfrm>
-          <a:prstGeom prst="rect">
-            <a:avLst/>
-          </a:prstGeom>
-          <a:noFill/>
-          <a:ln>
-            <a:noFill/>
-          </a:ln>
-        </p:spPr>
-      </p:pic>
       <p:sp>
         <p:nvSpPr>
           <p:cNvPr id="5" name="Title 1"/>
@@ -4649,6 +4615,47 @@
           </a:p>
         </p:txBody>
       </p:sp>
+      <p:pic>
+        <p:nvPicPr>
+          <p:cNvPr id="1026" name="Picture 2" descr="F:\thuc_tap\BLE_matlab\report\ppt\database_2020.05.11\R93.jpg"/>
+          <p:cNvPicPr>
+            <a:picLocks noChangeAspect="1" noChangeArrowheads="1"/>
+          </p:cNvPicPr>
+          <p:nvPr/>
+        </p:nvPicPr>
+        <p:blipFill>
+          <a:blip r:embed="rId2">
+            <a:extLst>
+              <a:ext uri="{28A0092B-C50C-407E-A947-70E740481C1C}">
+                <a14:useLocalDpi xmlns:a14="http://schemas.microsoft.com/office/drawing/2010/main" val="0"/>
+              </a:ext>
+            </a:extLst>
+          </a:blip>
+          <a:srcRect/>
+          <a:stretch>
+            <a:fillRect/>
+          </a:stretch>
+        </p:blipFill>
+        <p:spPr bwMode="auto">
+          <a:xfrm>
+            <a:off x="0" y="1066800"/>
+            <a:ext cx="9144000" cy="4267200"/>
+          </a:xfrm>
+          <a:prstGeom prst="rect">
+            <a:avLst/>
+          </a:prstGeom>
+          <a:noFill/>
+          <a:extLst>
+            <a:ext uri="{909E8E84-426E-40DD-AFC4-6F175D3DCCD1}">
+              <a14:hiddenFill xmlns:a14="http://schemas.microsoft.com/office/drawing/2010/main">
+                <a:solidFill>
+                  <a:srgbClr val="FFFFFF"/>
+                </a:solidFill>
+              </a14:hiddenFill>
+            </a:ext>
+          </a:extLst>
+        </p:spPr>
+      </p:pic>
     </p:spTree>
     <p:extLst>
       <p:ext uri="{BB962C8B-B14F-4D97-AF65-F5344CB8AC3E}">
@@ -4942,7 +4949,6 @@
               <a:rPr lang="en-US" dirty="0" smtClean="0"/>
               <a:t>.</a:t>
             </a:r>
-            <a:endParaRPr lang="en-US" dirty="0" smtClean="0"/>
           </a:p>
           <a:p>
             <a:endParaRPr lang="en-US" dirty="0"/>
@@ -5076,8 +5082,8 @@
           </a:p>
         </p:txBody>
       </p:sp>
-      <mc:AlternateContent xmlns:mc="http://schemas.openxmlformats.org/markup-compatibility/2006">
-        <mc:Choice xmlns:a14="http://schemas.microsoft.com/office/drawing/2010/main" Requires="a14">
+      <mc:AlternateContent xmlns:mc="http://schemas.openxmlformats.org/markup-compatibility/2006" xmlns:a14="http://schemas.microsoft.com/office/drawing/2010/main">
+        <mc:Choice Requires="a14">
           <p:sp>
             <p:nvSpPr>
               <p:cNvPr id="3" name="Content Placeholder 2"/>
@@ -5801,7 +5807,7 @@
             </p:txBody>
           </p:sp>
         </mc:Choice>
-        <mc:Fallback>
+        <mc:Fallback xmlns="">
           <p:sp>
             <p:nvSpPr>
               <p:cNvPr id="3" name="Content Placeholder 2"/>
@@ -6027,15 +6033,18 @@
             </a:r>
             <a:r>
               <a:rPr lang="en-US" sz="2000" dirty="0" smtClean="0"/>
-              <a:t> Exponent</a:t>
-            </a:r>
-            <a:endParaRPr lang="en-US" sz="2000" dirty="0"/>
+              <a:t> </a:t>
+            </a:r>
+            <a:r>
+              <a:rPr lang="en-US" sz="2000" dirty="0" smtClean="0"/>
+              <a:t>Exponent TAG59</a:t>
+            </a:r>
           </a:p>
         </p:txBody>
       </p:sp>
       <p:pic>
         <p:nvPicPr>
-          <p:cNvPr id="1026" name="Picture 2" descr="F:\thuc_tap\BLE_matlab\report\ppt\static_pathloss_Ver2.jpg"/>
+          <p:cNvPr id="2050" name="Picture 2" descr="F:\thuc_tap\BLE_matlab\report\ppt\database_2020.05.11\static_pathloss_59.jpg"/>
           <p:cNvPicPr>
             <a:picLocks noChangeAspect="1" noChangeArrowheads="1"/>
           </p:cNvPicPr>
@@ -6056,8 +6065,8 @@
         </p:blipFill>
         <p:spPr bwMode="auto">
           <a:xfrm>
-            <a:off x="0" y="1142999"/>
-            <a:ext cx="9144000" cy="4495801"/>
+            <a:off x="-25400" y="1143000"/>
+            <a:ext cx="9169400" cy="4495800"/>
           </a:xfrm>
           <a:prstGeom prst="rect">
             <a:avLst/>
@@ -6106,6 +6115,49 @@
       </p:grpSpPr>
       <p:sp>
         <p:nvSpPr>
+          <p:cNvPr id="5" name="Title 1"/>
+          <p:cNvSpPr txBox="1">
+            <a:spLocks/>
+          </p:cNvSpPr>
+          <p:nvPr/>
+        </p:nvSpPr>
+        <p:spPr>
+          <a:xfrm>
+            <a:off x="609600" y="5257800"/>
+            <a:ext cx="8229600" cy="1143000"/>
+          </a:xfrm>
+          <a:prstGeom prst="rect">
+            <a:avLst/>
+          </a:prstGeom>
+        </p:spPr>
+        <p:txBody>
+          <a:bodyPr vert="horz" lIns="91440" tIns="45720" rIns="91440" bIns="45720" rtlCol="0" anchor="ctr">
+            <a:normAutofit/>
+          </a:bodyPr>
+          <a:lstStyle>
+            <a:lvl1pPr algn="ctr" defTabSz="914400" rtl="0" eaLnBrk="1" latinLnBrk="0" hangingPunct="1">
+              <a:spcBef>
+                <a:spcPct val="0"/>
+              </a:spcBef>
+              <a:buNone/>
+              <a:defRPr sz="4400" kern="1200">
+                <a:solidFill>
+                  <a:schemeClr val="tx1"/>
+                </a:solidFill>
+                <a:latin typeface="+mj-lt"/>
+                <a:ea typeface="+mj-ea"/>
+                <a:cs typeface="+mj-cs"/>
+              </a:defRPr>
+            </a:lvl1pPr>
+          </a:lstStyle>
+          <a:p>
+            <a:pPr algn="just"/>
+            <a:endParaRPr lang="en-US" sz="2000" dirty="0"/>
+          </a:p>
+        </p:txBody>
+      </p:sp>
+      <p:sp>
+        <p:nvSpPr>
           <p:cNvPr id="2" name="Title 1"/>
           <p:cNvSpPr>
             <a:spLocks noGrp="1"/>
@@ -6127,9 +6179,114 @@
           </a:p>
         </p:txBody>
       </p:sp>
+      <p:sp>
+        <p:nvSpPr>
+          <p:cNvPr id="7" name="Title 1"/>
+          <p:cNvSpPr txBox="1">
+            <a:spLocks/>
+          </p:cNvSpPr>
+          <p:nvPr/>
+        </p:nvSpPr>
+        <p:spPr>
+          <a:xfrm>
+            <a:off x="457200" y="5410200"/>
+            <a:ext cx="8229600" cy="1143000"/>
+          </a:xfrm>
+          <a:prstGeom prst="rect">
+            <a:avLst/>
+          </a:prstGeom>
+        </p:spPr>
+        <p:txBody>
+          <a:bodyPr vert="horz" lIns="91440" tIns="45720" rIns="91440" bIns="45720" rtlCol="0" anchor="ctr">
+            <a:normAutofit/>
+          </a:bodyPr>
+          <a:lstStyle>
+            <a:lvl1pPr algn="ctr" defTabSz="914400" rtl="0" eaLnBrk="1" latinLnBrk="0" hangingPunct="1">
+              <a:spcBef>
+                <a:spcPct val="0"/>
+              </a:spcBef>
+              <a:buNone/>
+              <a:defRPr sz="4400" kern="1200">
+                <a:solidFill>
+                  <a:schemeClr val="tx1"/>
+                </a:solidFill>
+                <a:latin typeface="+mj-lt"/>
+                <a:ea typeface="+mj-ea"/>
+                <a:cs typeface="+mj-cs"/>
+              </a:defRPr>
+            </a:lvl1pPr>
+          </a:lstStyle>
+          <a:p>
+            <a:r>
+              <a:rPr lang="en-US" sz="2000" dirty="0" smtClean="0"/>
+              <a:t>So </a:t>
+            </a:r>
+            <a:r>
+              <a:rPr lang="en-US" sz="2000" dirty="0" err="1" smtClean="0"/>
+              <a:t>sánh</a:t>
+            </a:r>
+            <a:r>
+              <a:rPr lang="en-US" sz="2000" dirty="0" smtClean="0"/>
+              <a:t> </a:t>
+            </a:r>
+            <a:r>
+              <a:rPr lang="en-US" sz="2000" dirty="0" err="1" smtClean="0"/>
+              <a:t>kết</a:t>
+            </a:r>
+            <a:r>
+              <a:rPr lang="en-US" sz="2000" dirty="0" smtClean="0"/>
+              <a:t> </a:t>
+            </a:r>
+            <a:r>
+              <a:rPr lang="en-US" sz="2000" dirty="0" err="1" smtClean="0"/>
+              <a:t>quả</a:t>
+            </a:r>
+            <a:r>
+              <a:rPr lang="en-US" sz="2000" dirty="0" smtClean="0"/>
+              <a:t> </a:t>
+            </a:r>
+            <a:r>
+              <a:rPr lang="en-US" sz="2000" dirty="0" err="1" smtClean="0"/>
+              <a:t>sử</a:t>
+            </a:r>
+            <a:r>
+              <a:rPr lang="en-US" sz="2000" dirty="0" smtClean="0"/>
+              <a:t> </a:t>
+            </a:r>
+            <a:r>
+              <a:rPr lang="en-US" sz="2000" dirty="0" err="1" smtClean="0"/>
+              <a:t>dụng</a:t>
+            </a:r>
+            <a:r>
+              <a:rPr lang="en-US" sz="2000" dirty="0" smtClean="0"/>
+              <a:t> Dynamic </a:t>
+            </a:r>
+            <a:r>
+              <a:rPr lang="en-US" sz="2000" dirty="0" err="1" smtClean="0"/>
+              <a:t>và</a:t>
+            </a:r>
+            <a:r>
+              <a:rPr lang="en-US" sz="2000" dirty="0" smtClean="0"/>
+              <a:t> Static </a:t>
+            </a:r>
+            <a:r>
+              <a:rPr lang="en-US" sz="2000" dirty="0" err="1" smtClean="0"/>
+              <a:t>Pathloss</a:t>
+            </a:r>
+            <a:r>
+              <a:rPr lang="en-US" sz="2000" dirty="0" smtClean="0"/>
+              <a:t> </a:t>
+            </a:r>
+            <a:r>
+              <a:rPr lang="en-US" sz="2000" dirty="0" smtClean="0"/>
+              <a:t>Exponent TAG93</a:t>
+            </a:r>
+          </a:p>
+        </p:txBody>
+      </p:sp>
       <p:pic>
         <p:nvPicPr>
-          <p:cNvPr id="4098" name="Picture 2" descr="F:\thuc_tap\BLE_matlab\report\ppt\dynamic_pathloss.jpg"/>
+          <p:cNvPr id="3074" name="Picture 2" descr="F:\thuc_tap\BLE_matlab\report\ppt\database_2020.05.11\static_pathloss_93.jpg"/>
           <p:cNvPicPr>
             <a:picLocks noChangeAspect="1" noChangeArrowheads="1"/>
           </p:cNvPicPr>
@@ -6150,8 +6307,8 @@
         </p:blipFill>
         <p:spPr bwMode="auto">
           <a:xfrm>
-            <a:off x="-12700" y="1143000"/>
-            <a:ext cx="9156700" cy="4648200"/>
+            <a:off x="0" y="1058862"/>
+            <a:ext cx="9144000" cy="4770438"/>
           </a:xfrm>
           <a:prstGeom prst="rect">
             <a:avLst/>
@@ -6168,6 +6325,935 @@
           </a:extLst>
         </p:spPr>
       </p:pic>
+    </p:spTree>
+    <p:extLst>
+      <p:ext uri="{BB962C8B-B14F-4D97-AF65-F5344CB8AC3E}">
+        <p14:creationId xmlns:p14="http://schemas.microsoft.com/office/powerpoint/2010/main" val="418077083"/>
+      </p:ext>
+    </p:extLst>
+  </p:cSld>
+  <p:clrMapOvr>
+    <a:masterClrMapping/>
+  </p:clrMapOvr>
+</p:sld>
+</file>
+
+<file path=ppt/slides/slide18.xml><?xml version="1.0" encoding="utf-8"?>
+<p:sld xmlns:a="http://schemas.openxmlformats.org/drawingml/2006/main" xmlns:r="http://schemas.openxmlformats.org/officeDocument/2006/relationships" xmlns:p="http://schemas.openxmlformats.org/presentationml/2006/main">
+  <p:cSld>
+    <p:spTree>
+      <p:nvGrpSpPr>
+        <p:cNvPr id="1" name=""/>
+        <p:cNvGrpSpPr/>
+        <p:nvPr/>
+      </p:nvGrpSpPr>
+      <p:grpSpPr>
+        <a:xfrm>
+          <a:off x="0" y="0"/>
+          <a:ext cx="0" cy="0"/>
+          <a:chOff x="0" y="0"/>
+          <a:chExt cx="0" cy="0"/>
+        </a:xfrm>
+      </p:grpSpPr>
+      <p:sp>
+        <p:nvSpPr>
+          <p:cNvPr id="5" name="Title 1"/>
+          <p:cNvSpPr txBox="1">
+            <a:spLocks/>
+          </p:cNvSpPr>
+          <p:nvPr/>
+        </p:nvSpPr>
+        <p:spPr>
+          <a:xfrm>
+            <a:off x="609600" y="5257800"/>
+            <a:ext cx="8229600" cy="1143000"/>
+          </a:xfrm>
+          <a:prstGeom prst="rect">
+            <a:avLst/>
+          </a:prstGeom>
+        </p:spPr>
+        <p:txBody>
+          <a:bodyPr vert="horz" lIns="91440" tIns="45720" rIns="91440" bIns="45720" rtlCol="0" anchor="ctr">
+            <a:normAutofit/>
+          </a:bodyPr>
+          <a:lstStyle>
+            <a:lvl1pPr algn="ctr" defTabSz="914400" rtl="0" eaLnBrk="1" latinLnBrk="0" hangingPunct="1">
+              <a:spcBef>
+                <a:spcPct val="0"/>
+              </a:spcBef>
+              <a:buNone/>
+              <a:defRPr sz="4400" kern="1200">
+                <a:solidFill>
+                  <a:schemeClr val="tx1"/>
+                </a:solidFill>
+                <a:latin typeface="+mj-lt"/>
+                <a:ea typeface="+mj-ea"/>
+                <a:cs typeface="+mj-cs"/>
+              </a:defRPr>
+            </a:lvl1pPr>
+          </a:lstStyle>
+          <a:p>
+            <a:pPr algn="just"/>
+            <a:endParaRPr lang="en-US" sz="2000" dirty="0"/>
+          </a:p>
+        </p:txBody>
+      </p:sp>
+      <p:sp>
+        <p:nvSpPr>
+          <p:cNvPr id="2" name="Title 1"/>
+          <p:cNvSpPr>
+            <a:spLocks noGrp="1"/>
+          </p:cNvSpPr>
+          <p:nvPr>
+            <p:ph type="title"/>
+          </p:nvPr>
+        </p:nvSpPr>
+        <p:spPr/>
+        <p:txBody>
+          <a:bodyPr/>
+          <a:lstStyle/>
+          <a:p>
+            <a:r>
+              <a:rPr lang="en-US" dirty="0" smtClean="0"/>
+              <a:t>IMPROVE PATHLOSS EXPONENT</a:t>
+            </a:r>
+            <a:endParaRPr lang="en-US" dirty="0"/>
+          </a:p>
+        </p:txBody>
+      </p:sp>
+      <p:sp>
+        <p:nvSpPr>
+          <p:cNvPr id="7" name="Title 1"/>
+          <p:cNvSpPr txBox="1">
+            <a:spLocks/>
+          </p:cNvSpPr>
+          <p:nvPr/>
+        </p:nvSpPr>
+        <p:spPr>
+          <a:xfrm>
+            <a:off x="457200" y="5410200"/>
+            <a:ext cx="8229600" cy="1143000"/>
+          </a:xfrm>
+          <a:prstGeom prst="rect">
+            <a:avLst/>
+          </a:prstGeom>
+        </p:spPr>
+        <p:txBody>
+          <a:bodyPr vert="horz" lIns="91440" tIns="45720" rIns="91440" bIns="45720" rtlCol="0" anchor="ctr">
+            <a:normAutofit/>
+          </a:bodyPr>
+          <a:lstStyle>
+            <a:lvl1pPr algn="ctr" defTabSz="914400" rtl="0" eaLnBrk="1" latinLnBrk="0" hangingPunct="1">
+              <a:spcBef>
+                <a:spcPct val="0"/>
+              </a:spcBef>
+              <a:buNone/>
+              <a:defRPr sz="4400" kern="1200">
+                <a:solidFill>
+                  <a:schemeClr val="tx1"/>
+                </a:solidFill>
+                <a:latin typeface="+mj-lt"/>
+                <a:ea typeface="+mj-ea"/>
+                <a:cs typeface="+mj-cs"/>
+              </a:defRPr>
+            </a:lvl1pPr>
+          </a:lstStyle>
+          <a:p>
+            <a:r>
+              <a:rPr lang="en-US" sz="2000" dirty="0" smtClean="0"/>
+              <a:t>So </a:t>
+            </a:r>
+            <a:r>
+              <a:rPr lang="en-US" sz="2000" dirty="0" err="1" smtClean="0"/>
+              <a:t>sánh</a:t>
+            </a:r>
+            <a:r>
+              <a:rPr lang="en-US" sz="2000" dirty="0" smtClean="0"/>
+              <a:t> </a:t>
+            </a:r>
+            <a:r>
+              <a:rPr lang="en-US" sz="2000" dirty="0" err="1" smtClean="0"/>
+              <a:t>kết</a:t>
+            </a:r>
+            <a:r>
+              <a:rPr lang="en-US" sz="2000" dirty="0" smtClean="0"/>
+              <a:t> </a:t>
+            </a:r>
+            <a:r>
+              <a:rPr lang="en-US" sz="2000" dirty="0" err="1" smtClean="0"/>
+              <a:t>quả</a:t>
+            </a:r>
+            <a:r>
+              <a:rPr lang="en-US" sz="2000" dirty="0" smtClean="0"/>
+              <a:t> </a:t>
+            </a:r>
+            <a:r>
+              <a:rPr lang="en-US" sz="2000" dirty="0" err="1" smtClean="0"/>
+              <a:t>sử</a:t>
+            </a:r>
+            <a:r>
+              <a:rPr lang="en-US" sz="2000" dirty="0" smtClean="0"/>
+              <a:t> </a:t>
+            </a:r>
+            <a:r>
+              <a:rPr lang="en-US" sz="2000" dirty="0" err="1" smtClean="0"/>
+              <a:t>dụng</a:t>
+            </a:r>
+            <a:r>
+              <a:rPr lang="en-US" sz="2000" dirty="0" smtClean="0"/>
+              <a:t> Dynamic </a:t>
+            </a:r>
+            <a:r>
+              <a:rPr lang="en-US" sz="2000" dirty="0" err="1" smtClean="0"/>
+              <a:t>và</a:t>
+            </a:r>
+            <a:r>
+              <a:rPr lang="en-US" sz="2000" dirty="0" smtClean="0"/>
+              <a:t> Static </a:t>
+            </a:r>
+            <a:r>
+              <a:rPr lang="en-US" sz="2000" dirty="0" err="1" smtClean="0"/>
+              <a:t>Pathloss</a:t>
+            </a:r>
+            <a:r>
+              <a:rPr lang="en-US" sz="2000" dirty="0" smtClean="0"/>
+              <a:t> </a:t>
+            </a:r>
+            <a:r>
+              <a:rPr lang="en-US" sz="2000" dirty="0" smtClean="0"/>
+              <a:t>Exponent TAGC2</a:t>
+            </a:r>
+          </a:p>
+        </p:txBody>
+      </p:sp>
+      <p:pic>
+        <p:nvPicPr>
+          <p:cNvPr id="4098" name="Picture 2" descr="F:\thuc_tap\BLE_matlab\report\ppt\database_2020.05.11\static_pathloss_c2.jpg"/>
+          <p:cNvPicPr>
+            <a:picLocks noChangeAspect="1" noChangeArrowheads="1"/>
+          </p:cNvPicPr>
+          <p:nvPr/>
+        </p:nvPicPr>
+        <p:blipFill>
+          <a:blip r:embed="rId2">
+            <a:extLst>
+              <a:ext uri="{28A0092B-C50C-407E-A947-70E740481C1C}">
+                <a14:useLocalDpi xmlns:a14="http://schemas.microsoft.com/office/drawing/2010/main" val="0"/>
+              </a:ext>
+            </a:extLst>
+          </a:blip>
+          <a:srcRect/>
+          <a:stretch>
+            <a:fillRect/>
+          </a:stretch>
+        </p:blipFill>
+        <p:spPr bwMode="auto">
+          <a:xfrm>
+            <a:off x="0" y="1066800"/>
+            <a:ext cx="9144000" cy="4762500"/>
+          </a:xfrm>
+          <a:prstGeom prst="rect">
+            <a:avLst/>
+          </a:prstGeom>
+          <a:noFill/>
+          <a:extLst>
+            <a:ext uri="{909E8E84-426E-40DD-AFC4-6F175D3DCCD1}">
+              <a14:hiddenFill xmlns:a14="http://schemas.microsoft.com/office/drawing/2010/main">
+                <a:solidFill>
+                  <a:srgbClr val="FFFFFF"/>
+                </a:solidFill>
+              </a14:hiddenFill>
+            </a:ext>
+          </a:extLst>
+        </p:spPr>
+      </p:pic>
+    </p:spTree>
+    <p:extLst>
+      <p:ext uri="{BB962C8B-B14F-4D97-AF65-F5344CB8AC3E}">
+        <p14:creationId xmlns:p14="http://schemas.microsoft.com/office/powerpoint/2010/main" val="418077083"/>
+      </p:ext>
+    </p:extLst>
+  </p:cSld>
+  <p:clrMapOvr>
+    <a:masterClrMapping/>
+  </p:clrMapOvr>
+</p:sld>
+</file>
+
+<file path=ppt/slides/slide19.xml><?xml version="1.0" encoding="utf-8"?>
+<p:sld xmlns:a="http://schemas.openxmlformats.org/drawingml/2006/main" xmlns:r="http://schemas.openxmlformats.org/officeDocument/2006/relationships" xmlns:p="http://schemas.openxmlformats.org/presentationml/2006/main">
+  <p:cSld>
+    <p:spTree>
+      <p:nvGrpSpPr>
+        <p:cNvPr id="1" name=""/>
+        <p:cNvGrpSpPr/>
+        <p:nvPr/>
+      </p:nvGrpSpPr>
+      <p:grpSpPr>
+        <a:xfrm>
+          <a:off x="0" y="0"/>
+          <a:ext cx="0" cy="0"/>
+          <a:chOff x="0" y="0"/>
+          <a:chExt cx="0" cy="0"/>
+        </a:xfrm>
+      </p:grpSpPr>
+      <p:sp>
+        <p:nvSpPr>
+          <p:cNvPr id="5" name="Title 1"/>
+          <p:cNvSpPr txBox="1">
+            <a:spLocks/>
+          </p:cNvSpPr>
+          <p:nvPr/>
+        </p:nvSpPr>
+        <p:spPr>
+          <a:xfrm>
+            <a:off x="609600" y="5257800"/>
+            <a:ext cx="8229600" cy="1143000"/>
+          </a:xfrm>
+          <a:prstGeom prst="rect">
+            <a:avLst/>
+          </a:prstGeom>
+        </p:spPr>
+        <p:txBody>
+          <a:bodyPr vert="horz" lIns="91440" tIns="45720" rIns="91440" bIns="45720" rtlCol="0" anchor="ctr">
+            <a:normAutofit/>
+          </a:bodyPr>
+          <a:lstStyle>
+            <a:lvl1pPr algn="ctr" defTabSz="914400" rtl="0" eaLnBrk="1" latinLnBrk="0" hangingPunct="1">
+              <a:spcBef>
+                <a:spcPct val="0"/>
+              </a:spcBef>
+              <a:buNone/>
+              <a:defRPr sz="4400" kern="1200">
+                <a:solidFill>
+                  <a:schemeClr val="tx1"/>
+                </a:solidFill>
+                <a:latin typeface="+mj-lt"/>
+                <a:ea typeface="+mj-ea"/>
+                <a:cs typeface="+mj-cs"/>
+              </a:defRPr>
+            </a:lvl1pPr>
+          </a:lstStyle>
+          <a:p>
+            <a:pPr algn="just"/>
+            <a:endParaRPr lang="en-US" sz="2000" dirty="0"/>
+          </a:p>
+        </p:txBody>
+      </p:sp>
+      <p:sp>
+        <p:nvSpPr>
+          <p:cNvPr id="2" name="Title 1"/>
+          <p:cNvSpPr>
+            <a:spLocks noGrp="1"/>
+          </p:cNvSpPr>
+          <p:nvPr>
+            <p:ph type="title"/>
+          </p:nvPr>
+        </p:nvSpPr>
+        <p:spPr/>
+        <p:txBody>
+          <a:bodyPr/>
+          <a:lstStyle/>
+          <a:p>
+            <a:r>
+              <a:rPr lang="en-US" dirty="0" smtClean="0"/>
+              <a:t>IMPROVE PATHLOSS EXPONENT</a:t>
+            </a:r>
+            <a:endParaRPr lang="en-US" dirty="0"/>
+          </a:p>
+        </p:txBody>
+      </p:sp>
+      <p:sp>
+        <p:nvSpPr>
+          <p:cNvPr id="7" name="Title 1"/>
+          <p:cNvSpPr txBox="1">
+            <a:spLocks/>
+          </p:cNvSpPr>
+          <p:nvPr/>
+        </p:nvSpPr>
+        <p:spPr>
+          <a:xfrm>
+            <a:off x="457200" y="5410200"/>
+            <a:ext cx="8229600" cy="1143000"/>
+          </a:xfrm>
+          <a:prstGeom prst="rect">
+            <a:avLst/>
+          </a:prstGeom>
+        </p:spPr>
+        <p:txBody>
+          <a:bodyPr vert="horz" lIns="91440" tIns="45720" rIns="91440" bIns="45720" rtlCol="0" anchor="ctr">
+            <a:normAutofit/>
+          </a:bodyPr>
+          <a:lstStyle>
+            <a:lvl1pPr algn="ctr" defTabSz="914400" rtl="0" eaLnBrk="1" latinLnBrk="0" hangingPunct="1">
+              <a:spcBef>
+                <a:spcPct val="0"/>
+              </a:spcBef>
+              <a:buNone/>
+              <a:defRPr sz="4400" kern="1200">
+                <a:solidFill>
+                  <a:schemeClr val="tx1"/>
+                </a:solidFill>
+                <a:latin typeface="+mj-lt"/>
+                <a:ea typeface="+mj-ea"/>
+                <a:cs typeface="+mj-cs"/>
+              </a:defRPr>
+            </a:lvl1pPr>
+          </a:lstStyle>
+          <a:p>
+            <a:r>
+              <a:rPr lang="en-US" sz="2000" dirty="0" smtClean="0"/>
+              <a:t>So </a:t>
+            </a:r>
+            <a:r>
+              <a:rPr lang="en-US" sz="2000" dirty="0" err="1" smtClean="0"/>
+              <a:t>sánh</a:t>
+            </a:r>
+            <a:r>
+              <a:rPr lang="en-US" sz="2000" dirty="0" smtClean="0"/>
+              <a:t> </a:t>
+            </a:r>
+            <a:r>
+              <a:rPr lang="en-US" sz="2000" dirty="0" err="1" smtClean="0"/>
+              <a:t>kết</a:t>
+            </a:r>
+            <a:r>
+              <a:rPr lang="en-US" sz="2000" dirty="0" smtClean="0"/>
+              <a:t> </a:t>
+            </a:r>
+            <a:r>
+              <a:rPr lang="en-US" sz="2000" dirty="0" err="1" smtClean="0"/>
+              <a:t>quả</a:t>
+            </a:r>
+            <a:r>
+              <a:rPr lang="en-US" sz="2000" dirty="0" smtClean="0"/>
+              <a:t> </a:t>
+            </a:r>
+            <a:r>
+              <a:rPr lang="en-US" sz="2000" dirty="0" err="1" smtClean="0"/>
+              <a:t>sử</a:t>
+            </a:r>
+            <a:r>
+              <a:rPr lang="en-US" sz="2000" dirty="0" smtClean="0"/>
+              <a:t> </a:t>
+            </a:r>
+            <a:r>
+              <a:rPr lang="en-US" sz="2000" dirty="0" err="1" smtClean="0"/>
+              <a:t>dụng</a:t>
+            </a:r>
+            <a:r>
+              <a:rPr lang="en-US" sz="2000" dirty="0" smtClean="0"/>
+              <a:t> Dynamic </a:t>
+            </a:r>
+            <a:r>
+              <a:rPr lang="en-US" sz="2000" dirty="0" err="1" smtClean="0"/>
+              <a:t>và</a:t>
+            </a:r>
+            <a:r>
+              <a:rPr lang="en-US" sz="2000" dirty="0" smtClean="0"/>
+              <a:t> Static </a:t>
+            </a:r>
+            <a:r>
+              <a:rPr lang="en-US" sz="2000" dirty="0" err="1" smtClean="0"/>
+              <a:t>Pathloss</a:t>
+            </a:r>
+            <a:r>
+              <a:rPr lang="en-US" sz="2000" dirty="0" smtClean="0"/>
+              <a:t> </a:t>
+            </a:r>
+            <a:r>
+              <a:rPr lang="en-US" sz="2000" dirty="0" smtClean="0"/>
+              <a:t>Exponent TAGC0</a:t>
+            </a:r>
+          </a:p>
+        </p:txBody>
+      </p:sp>
+      <p:pic>
+        <p:nvPicPr>
+          <p:cNvPr id="5122" name="Picture 2" descr="F:\thuc_tap\BLE_matlab\report\ppt\database_2020.05.11\static_pathloss_c0.jpg"/>
+          <p:cNvPicPr>
+            <a:picLocks noChangeAspect="1" noChangeArrowheads="1"/>
+          </p:cNvPicPr>
+          <p:nvPr/>
+        </p:nvPicPr>
+        <p:blipFill>
+          <a:blip r:embed="rId2">
+            <a:extLst>
+              <a:ext uri="{28A0092B-C50C-407E-A947-70E740481C1C}">
+                <a14:useLocalDpi xmlns:a14="http://schemas.microsoft.com/office/drawing/2010/main" val="0"/>
+              </a:ext>
+            </a:extLst>
+          </a:blip>
+          <a:srcRect/>
+          <a:stretch>
+            <a:fillRect/>
+          </a:stretch>
+        </p:blipFill>
+        <p:spPr bwMode="auto">
+          <a:xfrm>
+            <a:off x="0" y="1143000"/>
+            <a:ext cx="9144000" cy="4572000"/>
+          </a:xfrm>
+          <a:prstGeom prst="rect">
+            <a:avLst/>
+          </a:prstGeom>
+          <a:noFill/>
+          <a:extLst>
+            <a:ext uri="{909E8E84-426E-40DD-AFC4-6F175D3DCCD1}">
+              <a14:hiddenFill xmlns:a14="http://schemas.microsoft.com/office/drawing/2010/main">
+                <a:solidFill>
+                  <a:srgbClr val="FFFFFF"/>
+                </a:solidFill>
+              </a14:hiddenFill>
+            </a:ext>
+          </a:extLst>
+        </p:spPr>
+      </p:pic>
+    </p:spTree>
+    <p:extLst>
+      <p:ext uri="{BB962C8B-B14F-4D97-AF65-F5344CB8AC3E}">
+        <p14:creationId xmlns:p14="http://schemas.microsoft.com/office/powerpoint/2010/main" val="418077083"/>
+      </p:ext>
+    </p:extLst>
+  </p:cSld>
+  <p:clrMapOvr>
+    <a:masterClrMapping/>
+  </p:clrMapOvr>
+</p:sld>
+</file>
+
+<file path=ppt/slides/slide2.xml><?xml version="1.0" encoding="utf-8"?>
+<p:sld xmlns:a="http://schemas.openxmlformats.org/drawingml/2006/main" xmlns:r="http://schemas.openxmlformats.org/officeDocument/2006/relationships" xmlns:p="http://schemas.openxmlformats.org/presentationml/2006/main">
+  <p:cSld>
+    <p:spTree>
+      <p:nvGrpSpPr>
+        <p:cNvPr id="1" name=""/>
+        <p:cNvGrpSpPr/>
+        <p:nvPr/>
+      </p:nvGrpSpPr>
+      <p:grpSpPr>
+        <a:xfrm>
+          <a:off x="0" y="0"/>
+          <a:ext cx="0" cy="0"/>
+          <a:chOff x="0" y="0"/>
+          <a:chExt cx="0" cy="0"/>
+        </a:xfrm>
+      </p:grpSpPr>
+      <p:sp>
+        <p:nvSpPr>
+          <p:cNvPr id="3" name="Content Placeholder 2"/>
+          <p:cNvSpPr>
+            <a:spLocks noGrp="1"/>
+          </p:cNvSpPr>
+          <p:nvPr>
+            <p:ph idx="1"/>
+          </p:nvPr>
+        </p:nvSpPr>
+        <p:spPr/>
+        <p:txBody>
+          <a:bodyPr/>
+          <a:lstStyle/>
+          <a:p>
+            <a:pPr algn="just"/>
+            <a:r>
+              <a:rPr lang="en-US" dirty="0" err="1" smtClean="0"/>
+              <a:t>Hệ</a:t>
+            </a:r>
+            <a:r>
+              <a:rPr lang="en-US" dirty="0" smtClean="0"/>
+              <a:t> </a:t>
+            </a:r>
+            <a:r>
+              <a:rPr lang="en-US" dirty="0" err="1" smtClean="0"/>
+              <a:t>thống</a:t>
+            </a:r>
+            <a:r>
+              <a:rPr lang="en-US" dirty="0" smtClean="0"/>
+              <a:t>: 4 </a:t>
+            </a:r>
+            <a:r>
+              <a:rPr lang="en-US" dirty="0" err="1" smtClean="0"/>
+              <a:t>thiết</a:t>
+            </a:r>
+            <a:r>
+              <a:rPr lang="en-US" dirty="0" smtClean="0"/>
+              <a:t> </a:t>
+            </a:r>
+            <a:r>
+              <a:rPr lang="en-US" dirty="0" err="1" smtClean="0"/>
+              <a:t>bị</a:t>
+            </a:r>
+            <a:r>
+              <a:rPr lang="en-US" dirty="0" smtClean="0"/>
+              <a:t> </a:t>
+            </a:r>
+            <a:r>
+              <a:rPr lang="en-US" dirty="0" err="1" smtClean="0"/>
+              <a:t>phát</a:t>
+            </a:r>
+            <a:r>
+              <a:rPr lang="en-US" dirty="0" smtClean="0"/>
+              <a:t> (Beacon), 3 </a:t>
+            </a:r>
+            <a:r>
+              <a:rPr lang="en-US" dirty="0" err="1" smtClean="0"/>
+              <a:t>thiết</a:t>
+            </a:r>
+            <a:r>
+              <a:rPr lang="en-US" dirty="0" smtClean="0"/>
+              <a:t> </a:t>
+            </a:r>
+            <a:r>
+              <a:rPr lang="en-US" dirty="0" err="1" smtClean="0"/>
+              <a:t>bị</a:t>
+            </a:r>
+            <a:r>
+              <a:rPr lang="en-US" dirty="0" smtClean="0"/>
+              <a:t> </a:t>
+            </a:r>
+            <a:r>
+              <a:rPr lang="en-US" dirty="0" err="1" smtClean="0"/>
+              <a:t>thu</a:t>
+            </a:r>
+            <a:r>
+              <a:rPr lang="en-US" dirty="0" smtClean="0"/>
+              <a:t> (Tag, </a:t>
+            </a:r>
+            <a:r>
+              <a:rPr lang="en-US" dirty="0" err="1" smtClean="0"/>
+              <a:t>Pathloss</a:t>
+            </a:r>
+            <a:r>
+              <a:rPr lang="en-US" dirty="0" smtClean="0"/>
+              <a:t>, Gateway)</a:t>
+            </a:r>
+          </a:p>
+          <a:p>
+            <a:pPr algn="just"/>
+            <a:r>
+              <a:rPr lang="en-US" dirty="0" err="1" smtClean="0"/>
+              <a:t>Tìm</a:t>
+            </a:r>
+            <a:r>
+              <a:rPr lang="en-US" dirty="0" smtClean="0"/>
+              <a:t> </a:t>
+            </a:r>
+            <a:r>
+              <a:rPr lang="en-US" dirty="0" err="1" smtClean="0"/>
+              <a:t>được</a:t>
+            </a:r>
+            <a:r>
+              <a:rPr lang="en-US" dirty="0" smtClean="0"/>
+              <a:t> </a:t>
+            </a:r>
+            <a:r>
+              <a:rPr lang="en-US" dirty="0" err="1" smtClean="0"/>
+              <a:t>khoảng</a:t>
+            </a:r>
+            <a:r>
+              <a:rPr lang="en-US" dirty="0" smtClean="0"/>
+              <a:t> </a:t>
+            </a:r>
+            <a:r>
+              <a:rPr lang="en-US" dirty="0" err="1" smtClean="0"/>
+              <a:t>cách</a:t>
+            </a:r>
+            <a:r>
+              <a:rPr lang="en-US" dirty="0" smtClean="0"/>
+              <a:t> </a:t>
+            </a:r>
+            <a:r>
+              <a:rPr lang="en-US" dirty="0" err="1" smtClean="0"/>
+              <a:t>từ</a:t>
+            </a:r>
+            <a:r>
+              <a:rPr lang="en-US" dirty="0" smtClean="0"/>
+              <a:t> </a:t>
+            </a:r>
+            <a:r>
+              <a:rPr lang="en-US" dirty="0" err="1" smtClean="0"/>
+              <a:t>điểm</a:t>
+            </a:r>
+            <a:r>
+              <a:rPr lang="en-US" dirty="0" smtClean="0"/>
+              <a:t> </a:t>
+            </a:r>
+            <a:r>
+              <a:rPr lang="en-US" dirty="0" err="1" smtClean="0"/>
+              <a:t>thu</a:t>
+            </a:r>
+            <a:r>
+              <a:rPr lang="en-US" dirty="0" smtClean="0"/>
+              <a:t> </a:t>
+            </a:r>
+            <a:r>
+              <a:rPr lang="en-US" dirty="0" err="1" smtClean="0"/>
+              <a:t>đến</a:t>
+            </a:r>
+            <a:r>
+              <a:rPr lang="en-US" dirty="0" smtClean="0"/>
+              <a:t> 4 </a:t>
+            </a:r>
+            <a:r>
+              <a:rPr lang="en-US" dirty="0" err="1" smtClean="0"/>
+              <a:t>điểm</a:t>
+            </a:r>
+            <a:r>
+              <a:rPr lang="en-US" dirty="0" smtClean="0"/>
+              <a:t> </a:t>
+            </a:r>
+            <a:r>
+              <a:rPr lang="en-US" dirty="0" err="1" smtClean="0"/>
+              <a:t>phát</a:t>
+            </a:r>
+            <a:r>
+              <a:rPr lang="en-US" dirty="0" smtClean="0"/>
+              <a:t> =&gt; </a:t>
+            </a:r>
+            <a:r>
+              <a:rPr lang="en-US" dirty="0" err="1" smtClean="0"/>
+              <a:t>thành</a:t>
+            </a:r>
+            <a:r>
+              <a:rPr lang="en-US" dirty="0" smtClean="0"/>
+              <a:t> </a:t>
+            </a:r>
+            <a:r>
+              <a:rPr lang="en-US" dirty="0" err="1" smtClean="0"/>
+              <a:t>lập</a:t>
+            </a:r>
+            <a:r>
+              <a:rPr lang="en-US" dirty="0" smtClean="0"/>
+              <a:t> </a:t>
+            </a:r>
+            <a:r>
+              <a:rPr lang="en-US" dirty="0" err="1" smtClean="0"/>
+              <a:t>được</a:t>
+            </a:r>
+            <a:r>
+              <a:rPr lang="en-US" dirty="0" smtClean="0"/>
+              <a:t> </a:t>
+            </a:r>
+            <a:r>
+              <a:rPr lang="en-US" dirty="0" err="1" smtClean="0"/>
+              <a:t>hệ</a:t>
+            </a:r>
+            <a:r>
+              <a:rPr lang="en-US" dirty="0" smtClean="0"/>
+              <a:t> </a:t>
+            </a:r>
+            <a:r>
+              <a:rPr lang="en-US" dirty="0" err="1" smtClean="0"/>
+              <a:t>phương</a:t>
+            </a:r>
+            <a:r>
+              <a:rPr lang="en-US" dirty="0" smtClean="0"/>
+              <a:t> </a:t>
+            </a:r>
+            <a:r>
+              <a:rPr lang="en-US" dirty="0" err="1" smtClean="0"/>
+              <a:t>trình</a:t>
+            </a:r>
+            <a:r>
+              <a:rPr lang="en-US" dirty="0" smtClean="0"/>
+              <a:t> =&gt; </a:t>
+            </a:r>
+            <a:r>
+              <a:rPr lang="en-US" dirty="0" err="1" smtClean="0"/>
+              <a:t>tìm</a:t>
+            </a:r>
+            <a:r>
+              <a:rPr lang="en-US" dirty="0" smtClean="0"/>
+              <a:t> </a:t>
+            </a:r>
+            <a:r>
+              <a:rPr lang="en-US" dirty="0" err="1" smtClean="0"/>
+              <a:t>được</a:t>
+            </a:r>
+            <a:r>
+              <a:rPr lang="en-US" dirty="0" smtClean="0"/>
+              <a:t> </a:t>
+            </a:r>
+            <a:r>
+              <a:rPr lang="en-US" dirty="0" err="1" smtClean="0"/>
+              <a:t>vị</a:t>
+            </a:r>
+            <a:r>
+              <a:rPr lang="en-US" dirty="0" smtClean="0"/>
+              <a:t> </a:t>
+            </a:r>
+            <a:r>
+              <a:rPr lang="en-US" dirty="0" err="1" smtClean="0"/>
+              <a:t>trí</a:t>
+            </a:r>
+            <a:r>
+              <a:rPr lang="en-US" dirty="0" smtClean="0"/>
+              <a:t> </a:t>
+            </a:r>
+            <a:r>
+              <a:rPr lang="en-US" dirty="0" err="1" smtClean="0"/>
+              <a:t>của</a:t>
+            </a:r>
+            <a:r>
+              <a:rPr lang="en-US" dirty="0" smtClean="0"/>
+              <a:t> </a:t>
+            </a:r>
+            <a:r>
+              <a:rPr lang="en-US" dirty="0" err="1" smtClean="0"/>
+              <a:t>thiết</a:t>
+            </a:r>
+            <a:r>
+              <a:rPr lang="en-US" dirty="0" smtClean="0"/>
+              <a:t> </a:t>
+            </a:r>
+            <a:r>
+              <a:rPr lang="en-US" dirty="0" err="1" smtClean="0"/>
+              <a:t>bị</a:t>
+            </a:r>
+            <a:r>
+              <a:rPr lang="en-US" dirty="0" smtClean="0"/>
+              <a:t> </a:t>
+            </a:r>
+            <a:r>
+              <a:rPr lang="en-US" dirty="0" err="1" smtClean="0"/>
+              <a:t>thu</a:t>
+            </a:r>
+            <a:r>
+              <a:rPr lang="en-US" dirty="0" smtClean="0"/>
+              <a:t> </a:t>
+            </a:r>
+            <a:r>
+              <a:rPr lang="en-US" dirty="0" err="1" smtClean="0"/>
+              <a:t>nếu</a:t>
+            </a:r>
+            <a:r>
+              <a:rPr lang="en-US" dirty="0" smtClean="0"/>
+              <a:t> </a:t>
+            </a:r>
+            <a:r>
+              <a:rPr lang="en-US" dirty="0" err="1" smtClean="0"/>
+              <a:t>biết</a:t>
+            </a:r>
+            <a:r>
+              <a:rPr lang="en-US" dirty="0" smtClean="0"/>
+              <a:t> </a:t>
+            </a:r>
+            <a:r>
+              <a:rPr lang="en-US" dirty="0" err="1" smtClean="0"/>
+              <a:t>vị</a:t>
+            </a:r>
+            <a:r>
+              <a:rPr lang="en-US" dirty="0" smtClean="0"/>
+              <a:t> </a:t>
+            </a:r>
+            <a:r>
+              <a:rPr lang="en-US" dirty="0" err="1" smtClean="0"/>
+              <a:t>trí</a:t>
+            </a:r>
+            <a:r>
+              <a:rPr lang="en-US" dirty="0" smtClean="0"/>
+              <a:t> 4 </a:t>
+            </a:r>
+            <a:r>
+              <a:rPr lang="en-US" dirty="0" err="1" smtClean="0"/>
+              <a:t>thiết</a:t>
+            </a:r>
+            <a:r>
+              <a:rPr lang="en-US" dirty="0" smtClean="0"/>
+              <a:t> </a:t>
+            </a:r>
+            <a:r>
+              <a:rPr lang="en-US" dirty="0" err="1" smtClean="0"/>
+              <a:t>bị</a:t>
+            </a:r>
+            <a:r>
+              <a:rPr lang="en-US" dirty="0" smtClean="0"/>
+              <a:t> </a:t>
+            </a:r>
+            <a:r>
+              <a:rPr lang="en-US" dirty="0" err="1" smtClean="0"/>
+              <a:t>phát</a:t>
+            </a:r>
+            <a:endParaRPr lang="en-US" dirty="0"/>
+          </a:p>
+        </p:txBody>
+      </p:sp>
+      <p:sp>
+        <p:nvSpPr>
+          <p:cNvPr id="4" name="Title 1"/>
+          <p:cNvSpPr>
+            <a:spLocks noGrp="1"/>
+          </p:cNvSpPr>
+          <p:nvPr>
+            <p:ph type="title"/>
+          </p:nvPr>
+        </p:nvSpPr>
+        <p:spPr/>
+        <p:txBody>
+          <a:bodyPr/>
+          <a:lstStyle/>
+          <a:p>
+            <a:r>
+              <a:rPr lang="en-US" dirty="0" smtClean="0"/>
+              <a:t>INDOOR POSITIONING SYSTEM</a:t>
+            </a:r>
+            <a:endParaRPr lang="en-US" dirty="0"/>
+          </a:p>
+        </p:txBody>
+      </p:sp>
+    </p:spTree>
+    <p:extLst>
+      <p:ext uri="{BB962C8B-B14F-4D97-AF65-F5344CB8AC3E}">
+        <p14:creationId xmlns:p14="http://schemas.microsoft.com/office/powerpoint/2010/main" val="1127468315"/>
+      </p:ext>
+    </p:extLst>
+  </p:cSld>
+  <p:clrMapOvr>
+    <a:masterClrMapping/>
+  </p:clrMapOvr>
+</p:sld>
+</file>
+
+<file path=ppt/slides/slide20.xml><?xml version="1.0" encoding="utf-8"?>
+<p:sld xmlns:a="http://schemas.openxmlformats.org/drawingml/2006/main" xmlns:r="http://schemas.openxmlformats.org/officeDocument/2006/relationships" xmlns:p="http://schemas.openxmlformats.org/presentationml/2006/main">
+  <p:cSld>
+    <p:spTree>
+      <p:nvGrpSpPr>
+        <p:cNvPr id="1" name=""/>
+        <p:cNvGrpSpPr/>
+        <p:nvPr/>
+      </p:nvGrpSpPr>
+      <p:grpSpPr>
+        <a:xfrm>
+          <a:off x="0" y="0"/>
+          <a:ext cx="0" cy="0"/>
+          <a:chOff x="0" y="0"/>
+          <a:chExt cx="0" cy="0"/>
+        </a:xfrm>
+      </p:grpSpPr>
+      <p:sp>
+        <p:nvSpPr>
+          <p:cNvPr id="2" name="Title 1"/>
+          <p:cNvSpPr>
+            <a:spLocks noGrp="1"/>
+          </p:cNvSpPr>
+          <p:nvPr>
+            <p:ph type="title"/>
+          </p:nvPr>
+        </p:nvSpPr>
+        <p:spPr/>
+        <p:txBody>
+          <a:bodyPr/>
+          <a:lstStyle/>
+          <a:p>
+            <a:r>
+              <a:rPr lang="en-US" dirty="0" smtClean="0"/>
+              <a:t>IMPROVE PATHLOSS EXPONENT</a:t>
+            </a:r>
+            <a:endParaRPr lang="en-US" dirty="0"/>
+          </a:p>
+        </p:txBody>
+      </p:sp>
       <p:sp>
         <p:nvSpPr>
           <p:cNvPr id="5" name="Title 1"/>
@@ -6258,6 +7344,47 @@
           </a:p>
         </p:txBody>
       </p:sp>
+      <p:pic>
+        <p:nvPicPr>
+          <p:cNvPr id="6146" name="Picture 2" descr="F:\thuc_tap\BLE_matlab\report\ppt\database_2020.05.11\dynamic_pathlosss.jpg"/>
+          <p:cNvPicPr>
+            <a:picLocks noChangeAspect="1" noChangeArrowheads="1"/>
+          </p:cNvPicPr>
+          <p:nvPr/>
+        </p:nvPicPr>
+        <p:blipFill>
+          <a:blip r:embed="rId2">
+            <a:extLst>
+              <a:ext uri="{28A0092B-C50C-407E-A947-70E740481C1C}">
+                <a14:useLocalDpi xmlns:a14="http://schemas.microsoft.com/office/drawing/2010/main" val="0"/>
+              </a:ext>
+            </a:extLst>
+          </a:blip>
+          <a:srcRect/>
+          <a:stretch>
+            <a:fillRect/>
+          </a:stretch>
+        </p:blipFill>
+        <p:spPr bwMode="auto">
+          <a:xfrm>
+            <a:off x="0" y="1206500"/>
+            <a:ext cx="9144000" cy="4660900"/>
+          </a:xfrm>
+          <a:prstGeom prst="rect">
+            <a:avLst/>
+          </a:prstGeom>
+          <a:noFill/>
+          <a:extLst>
+            <a:ext uri="{909E8E84-426E-40DD-AFC4-6F175D3DCCD1}">
+              <a14:hiddenFill xmlns:a14="http://schemas.microsoft.com/office/drawing/2010/main">
+                <a:solidFill>
+                  <a:srgbClr val="FFFFFF"/>
+                </a:solidFill>
+              </a14:hiddenFill>
+            </a:ext>
+          </a:extLst>
+        </p:spPr>
+      </p:pic>
     </p:spTree>
     <p:extLst>
       <p:ext uri="{BB962C8B-B14F-4D97-AF65-F5344CB8AC3E}">
@@ -6271,7 +7398,7 @@
 </p:sld>
 </file>
 
-<file path=ppt/slides/slide18.xml><?xml version="1.0" encoding="utf-8"?>
+<file path=ppt/slides/slide21.xml><?xml version="1.0" encoding="utf-8"?>
 <p:sld xmlns:a="http://schemas.openxmlformats.org/drawingml/2006/main" xmlns:r="http://schemas.openxmlformats.org/officeDocument/2006/relationships" xmlns:p="http://schemas.openxmlformats.org/presentationml/2006/main">
   <p:cSld>
     <p:spTree>
@@ -6321,153 +7448,39 @@
             <p:ph idx="1"/>
           </p:nvPr>
         </p:nvSpPr>
-        <p:spPr/>
+        <p:spPr>
+          <a:xfrm>
+            <a:off x="457200" y="1600200"/>
+            <a:ext cx="8382000" cy="4525963"/>
+          </a:xfrm>
+        </p:spPr>
         <p:txBody>
           <a:bodyPr>
-            <a:normAutofit/>
+            <a:normAutofit lnSpcReduction="10000"/>
           </a:bodyPr>
           <a:lstStyle/>
           <a:p>
             <a:pPr lvl="0" algn="just"/>
             <a:r>
-              <a:rPr lang="en-US" dirty="0"/>
-              <a:t>RSSI </a:t>
-            </a:r>
-            <a:r>
-              <a:rPr lang="en-US" dirty="0" err="1"/>
-              <a:t>được</a:t>
-            </a:r>
-            <a:r>
-              <a:rPr lang="en-US" dirty="0"/>
-              <a:t> </a:t>
-            </a:r>
-            <a:r>
-              <a:rPr lang="en-US" dirty="0" err="1"/>
-              <a:t>recorrect</a:t>
-            </a:r>
-            <a:r>
-              <a:rPr lang="en-US" dirty="0"/>
-              <a:t> </a:t>
-            </a:r>
-            <a:r>
-              <a:rPr lang="en-US" dirty="0" err="1"/>
-              <a:t>chịu</a:t>
-            </a:r>
-            <a:r>
-              <a:rPr lang="en-US" dirty="0"/>
-              <a:t> </a:t>
-            </a:r>
-            <a:r>
-              <a:rPr lang="en-US" dirty="0" err="1"/>
-              <a:t>ảnh</a:t>
-            </a:r>
-            <a:r>
-              <a:rPr lang="en-US" dirty="0"/>
-              <a:t> </a:t>
-            </a:r>
-            <a:r>
-              <a:rPr lang="en-US" dirty="0" err="1"/>
-              <a:t>hưởng</a:t>
-            </a:r>
-            <a:r>
-              <a:rPr lang="en-US" dirty="0"/>
-              <a:t> </a:t>
-            </a:r>
-            <a:r>
-              <a:rPr lang="en-US" dirty="0" err="1"/>
-              <a:t>từ</a:t>
-            </a:r>
-            <a:r>
-              <a:rPr lang="en-US" dirty="0"/>
-              <a:t> RSSI </a:t>
-            </a:r>
-            <a:r>
-              <a:rPr lang="en-US" dirty="0" err="1" smtClean="0"/>
-              <a:t>thô</a:t>
-            </a:r>
-            <a:r>
-              <a:rPr lang="en-US" dirty="0" smtClean="0"/>
-              <a:t>. </a:t>
-            </a:r>
-            <a:r>
-              <a:rPr lang="en-US" dirty="0"/>
-              <a:t>Ban </a:t>
-            </a:r>
-            <a:r>
-              <a:rPr lang="en-US" dirty="0" err="1"/>
-              <a:t>đêm</a:t>
-            </a:r>
-            <a:r>
-              <a:rPr lang="en-US" dirty="0"/>
-              <a:t> </a:t>
-            </a:r>
-            <a:r>
-              <a:rPr lang="en-US" dirty="0" err="1"/>
-              <a:t>ít</a:t>
-            </a:r>
-            <a:r>
-              <a:rPr lang="en-US" dirty="0"/>
-              <a:t> </a:t>
-            </a:r>
-            <a:r>
-              <a:rPr lang="en-US" dirty="0" err="1"/>
-              <a:t>biến</a:t>
-            </a:r>
-            <a:r>
-              <a:rPr lang="en-US" dirty="0"/>
-              <a:t> </a:t>
-            </a:r>
-            <a:r>
-              <a:rPr lang="en-US" dirty="0" err="1"/>
-              <a:t>động</a:t>
-            </a:r>
-            <a:r>
-              <a:rPr lang="en-US" dirty="0"/>
-              <a:t> </a:t>
-            </a:r>
-            <a:r>
-              <a:rPr lang="en-US" dirty="0" err="1"/>
-              <a:t>và</a:t>
-            </a:r>
-            <a:r>
-              <a:rPr lang="en-US" dirty="0"/>
-              <a:t> ban </a:t>
-            </a:r>
-            <a:r>
-              <a:rPr lang="en-US" dirty="0" err="1"/>
-              <a:t>ngày</a:t>
-            </a:r>
-            <a:r>
-              <a:rPr lang="en-US" dirty="0"/>
-              <a:t> </a:t>
-            </a:r>
-            <a:r>
-              <a:rPr lang="en-US" dirty="0" err="1"/>
-              <a:t>biến</a:t>
-            </a:r>
-            <a:r>
-              <a:rPr lang="en-US" dirty="0"/>
-              <a:t> </a:t>
-            </a:r>
-            <a:r>
-              <a:rPr lang="en-US" dirty="0" err="1"/>
-              <a:t>động</a:t>
-            </a:r>
-            <a:r>
-              <a:rPr lang="en-US" dirty="0"/>
-              <a:t> </a:t>
-            </a:r>
-            <a:r>
-              <a:rPr lang="en-US" dirty="0" err="1"/>
-              <a:t>mạnh</a:t>
-            </a:r>
-            <a:r>
-              <a:rPr lang="en-US" dirty="0"/>
-              <a:t>.</a:t>
-            </a:r>
-          </a:p>
-          <a:p>
-            <a:pPr lvl="0" algn="just"/>
+              <a:rPr lang="en-US" dirty="0" smtClean="0"/>
+              <a:t>Ở Tag 93, </a:t>
+            </a:r>
+            <a:r>
+              <a:rPr lang="en-US" dirty="0" err="1" smtClean="0"/>
+              <a:t>rõ</a:t>
+            </a:r>
+            <a:r>
+              <a:rPr lang="en-US" dirty="0" smtClean="0"/>
+              <a:t> </a:t>
+            </a:r>
+            <a:r>
+              <a:rPr lang="en-US" dirty="0" err="1" smtClean="0"/>
+              <a:t>ràng</a:t>
+            </a:r>
+            <a:r>
+              <a:rPr lang="en-US" dirty="0" smtClean="0"/>
+              <a:t> </a:t>
+            </a:r>
             <a:r>
               <a:rPr lang="en-US" b="1" dirty="0" smtClean="0"/>
               <a:t>Dynamic </a:t>
@@ -6510,6 +7523,14 @@
             </a:r>
             <a:r>
               <a:rPr lang="en-US" dirty="0" smtClean="0"/>
+              <a:t> 3 </a:t>
+            </a:r>
+            <a:r>
+              <a:rPr lang="en-US" dirty="0" err="1" smtClean="0"/>
+              <a:t>đêm</a:t>
+            </a:r>
+            <a:r>
+              <a:rPr lang="en-US" dirty="0" smtClean="0"/>
               <a:t> </a:t>
             </a:r>
             <a:r>
@@ -6522,6 +7543,46 @@
             </a:r>
             <a:r>
               <a:rPr lang="en-US" dirty="0" err="1" smtClean="0"/>
+              <a:t>và</a:t>
+            </a:r>
+            <a:r>
+              <a:rPr lang="en-US" dirty="0" smtClean="0"/>
+              <a:t> 2 </a:t>
+            </a:r>
+            <a:r>
+              <a:rPr lang="en-US" dirty="0" err="1" smtClean="0"/>
+              <a:t>ngày</a:t>
+            </a:r>
+            <a:r>
+              <a:rPr lang="en-US" dirty="0" smtClean="0"/>
+              <a:t> </a:t>
+            </a:r>
+            <a:r>
+              <a:rPr lang="en-US" dirty="0" err="1" smtClean="0"/>
+              <a:t>cuối</a:t>
+            </a:r>
+            <a:r>
+              <a:rPr lang="en-US" dirty="0" smtClean="0"/>
+              <a:t> </a:t>
+            </a:r>
+            <a:r>
+              <a:rPr lang="en-US" dirty="0" err="1" smtClean="0"/>
+              <a:t>tuần</a:t>
+            </a:r>
+            <a:r>
+              <a:rPr lang="en-US" dirty="0" smtClean="0"/>
+              <a:t> </a:t>
+            </a:r>
+            <a:r>
+              <a:rPr lang="en-US" dirty="0" err="1" smtClean="0"/>
+              <a:t>gần</a:t>
+            </a:r>
+            <a:r>
+              <a:rPr lang="en-US" dirty="0" smtClean="0"/>
+              <a:t> </a:t>
+            </a:r>
+            <a:r>
+              <a:rPr lang="en-US" dirty="0" err="1" smtClean="0"/>
               <a:t>như</a:t>
             </a:r>
             <a:r>
@@ -6530,15 +7591,7 @@
             </a:r>
             <a:r>
               <a:rPr lang="en-US" dirty="0" err="1" smtClean="0"/>
-              <a:t>đêm</a:t>
-            </a:r>
-            <a:r>
-              <a:rPr lang="en-US" dirty="0" smtClean="0"/>
-              <a:t> </a:t>
-            </a:r>
-            <a:r>
-              <a:rPr lang="en-US" dirty="0" err="1" smtClean="0"/>
-              <a:t>sau</a:t>
+              <a:t>nhau</a:t>
             </a:r>
             <a:r>
               <a:rPr lang="en-US" dirty="0" smtClean="0"/>
@@ -6581,25 +7634,106 @@
             <a:pPr lvl="0" algn="just"/>
             <a:r>
               <a:rPr lang="en-US" dirty="0" smtClean="0"/>
+              <a:t> 1 Tag + 4 Beacon = 1*4 </a:t>
+            </a:r>
+            <a:r>
+              <a:rPr lang="en-US" b="1" dirty="0" smtClean="0"/>
+              <a:t>Static </a:t>
+            </a:r>
+            <a:r>
+              <a:rPr lang="en-US" b="1" dirty="0" err="1" smtClean="0"/>
+              <a:t>Pathloss</a:t>
+            </a:r>
+            <a:r>
+              <a:rPr lang="en-US" b="1" dirty="0" smtClean="0"/>
+              <a:t> Exponent</a:t>
+            </a:r>
+            <a:r>
+              <a:rPr lang="en-US" dirty="0" smtClean="0"/>
+              <a:t>. </a:t>
+            </a:r>
+          </a:p>
+          <a:p>
+            <a:pPr lvl="0" algn="just"/>
+            <a:r>
+              <a:rPr lang="en-US" dirty="0"/>
               <a:t>=&gt; </a:t>
             </a:r>
             <a:r>
-              <a:rPr lang="en-US" dirty="0" err="1" smtClean="0"/>
-              <a:t>Dùng</a:t>
-            </a:r>
-            <a:r>
-              <a:rPr lang="en-US" dirty="0" smtClean="0"/>
-              <a:t> Dynamic </a:t>
-            </a:r>
-            <a:r>
-              <a:rPr lang="en-US" dirty="0" err="1" smtClean="0"/>
+              <a:rPr lang="en-US" b="1" dirty="0"/>
+              <a:t>m </a:t>
+            </a:r>
+            <a:r>
+              <a:rPr lang="en-US" dirty="0"/>
+              <a:t>Tag + </a:t>
+            </a:r>
+            <a:r>
+              <a:rPr lang="en-US" b="1" dirty="0"/>
+              <a:t>n</a:t>
+            </a:r>
+            <a:r>
+              <a:rPr lang="en-US" dirty="0"/>
+              <a:t> Beacon = </a:t>
+            </a:r>
+            <a:r>
+              <a:rPr lang="en-US" b="1" dirty="0"/>
+              <a:t>m*n Static </a:t>
+            </a:r>
+            <a:r>
+              <a:rPr lang="en-US" b="1" dirty="0" err="1"/>
               <a:t>Pathloss</a:t>
             </a:r>
             <a:r>
-              <a:rPr lang="en-US" dirty="0" smtClean="0"/>
+              <a:rPr lang="en-US" b="1" dirty="0"/>
+              <a:t>    </a:t>
+            </a:r>
+            <a:r>
+              <a:rPr lang="en-US" b="1" dirty="0" smtClean="0"/>
+              <a:t>Exponent</a:t>
+            </a:r>
+            <a:endParaRPr lang="en-US" dirty="0" smtClean="0"/>
+          </a:p>
+          <a:p>
+            <a:pPr marL="0" lvl="0" indent="0" algn="just">
+              <a:buNone/>
+            </a:pPr>
+            <a:r>
+              <a:rPr lang="en-US" dirty="0" smtClean="0"/>
+              <a:t>=&gt; </a:t>
+            </a:r>
+            <a:r>
+              <a:rPr lang="en-US" dirty="0" err="1"/>
+              <a:t>S</a:t>
+            </a:r>
+            <a:r>
+              <a:rPr lang="en-US" dirty="0" err="1" smtClean="0"/>
+              <a:t>ử</a:t>
+            </a:r>
+            <a:r>
+              <a:rPr lang="en-US" dirty="0" smtClean="0"/>
+              <a:t> </a:t>
+            </a:r>
+            <a:r>
+              <a:rPr lang="en-US" dirty="0" err="1" smtClean="0"/>
+              <a:t>dụng</a:t>
+            </a:r>
+            <a:r>
+              <a:rPr lang="en-US" dirty="0" smtClean="0"/>
+              <a:t> </a:t>
+            </a:r>
+            <a:r>
+              <a:rPr lang="en-US" b="1" dirty="0" smtClean="0"/>
+              <a:t>Dynamic </a:t>
+            </a:r>
+            <a:r>
+              <a:rPr lang="en-US" b="1" dirty="0" err="1" smtClean="0"/>
+              <a:t>Pathloss</a:t>
+            </a:r>
+            <a:r>
+              <a:rPr lang="en-US" b="1" dirty="0" smtClean="0"/>
               <a:t> Exponent</a:t>
             </a:r>
-            <a:endParaRPr lang="en-US" dirty="0"/>
+            <a:endParaRPr lang="en-US" b="1" dirty="0"/>
           </a:p>
           <a:p>
             <a:endParaRPr lang="en-US" dirty="0"/>
@@ -6619,7 +7753,7 @@
 </p:sld>
 </file>
 
-<file path=ppt/slides/slide19.xml><?xml version="1.0" encoding="utf-8"?>
+<file path=ppt/slides/slide22.xml><?xml version="1.0" encoding="utf-8"?>
 <p:sld xmlns:a="http://schemas.openxmlformats.org/drawingml/2006/main" xmlns:r="http://schemas.openxmlformats.org/officeDocument/2006/relationships" xmlns:p="http://schemas.openxmlformats.org/presentationml/2006/main">
   <p:cSld>
     <p:spTree>
@@ -6800,399 +7934,7 @@
 </p:sld>
 </file>
 
-<file path=ppt/slides/slide2.xml><?xml version="1.0" encoding="utf-8"?>
-<p:sld xmlns:a="http://schemas.openxmlformats.org/drawingml/2006/main" xmlns:r="http://schemas.openxmlformats.org/officeDocument/2006/relationships" xmlns:p="http://schemas.openxmlformats.org/presentationml/2006/main">
-  <p:cSld>
-    <p:spTree>
-      <p:nvGrpSpPr>
-        <p:cNvPr id="1" name=""/>
-        <p:cNvGrpSpPr/>
-        <p:nvPr/>
-      </p:nvGrpSpPr>
-      <p:grpSpPr>
-        <a:xfrm>
-          <a:off x="0" y="0"/>
-          <a:ext cx="0" cy="0"/>
-          <a:chOff x="0" y="0"/>
-          <a:chExt cx="0" cy="0"/>
-        </a:xfrm>
-      </p:grpSpPr>
-      <p:sp>
-        <p:nvSpPr>
-          <p:cNvPr id="3" name="Content Placeholder 2"/>
-          <p:cNvSpPr>
-            <a:spLocks noGrp="1"/>
-          </p:cNvSpPr>
-          <p:nvPr>
-            <p:ph idx="1"/>
-          </p:nvPr>
-        </p:nvSpPr>
-        <p:spPr/>
-        <p:txBody>
-          <a:bodyPr/>
-          <a:lstStyle/>
-          <a:p>
-            <a:pPr algn="just"/>
-            <a:r>
-              <a:rPr lang="en-US" dirty="0" err="1" smtClean="0"/>
-              <a:t>Hệ</a:t>
-            </a:r>
-            <a:r>
-              <a:rPr lang="en-US" dirty="0" smtClean="0"/>
-              <a:t> </a:t>
-            </a:r>
-            <a:r>
-              <a:rPr lang="en-US" dirty="0" err="1" smtClean="0"/>
-              <a:t>thống</a:t>
-            </a:r>
-            <a:r>
-              <a:rPr lang="en-US" dirty="0" smtClean="0"/>
-              <a:t>: 4 </a:t>
-            </a:r>
-            <a:r>
-              <a:rPr lang="en-US" dirty="0" err="1" smtClean="0"/>
-              <a:t>thiết</a:t>
-            </a:r>
-            <a:r>
-              <a:rPr lang="en-US" dirty="0" smtClean="0"/>
-              <a:t> </a:t>
-            </a:r>
-            <a:r>
-              <a:rPr lang="en-US" dirty="0" err="1" smtClean="0"/>
-              <a:t>bị</a:t>
-            </a:r>
-            <a:r>
-              <a:rPr lang="en-US" dirty="0" smtClean="0"/>
-              <a:t> </a:t>
-            </a:r>
-            <a:r>
-              <a:rPr lang="en-US" dirty="0" err="1" smtClean="0"/>
-              <a:t>phát</a:t>
-            </a:r>
-            <a:r>
-              <a:rPr lang="en-US" dirty="0" smtClean="0"/>
-              <a:t> (Beacon), 3 </a:t>
-            </a:r>
-            <a:r>
-              <a:rPr lang="en-US" dirty="0" err="1" smtClean="0"/>
-              <a:t>thiết</a:t>
-            </a:r>
-            <a:r>
-              <a:rPr lang="en-US" dirty="0" smtClean="0"/>
-              <a:t> </a:t>
-            </a:r>
-            <a:r>
-              <a:rPr lang="en-US" dirty="0" err="1" smtClean="0"/>
-              <a:t>bị</a:t>
-            </a:r>
-            <a:r>
-              <a:rPr lang="en-US" dirty="0" smtClean="0"/>
-              <a:t> </a:t>
-            </a:r>
-            <a:r>
-              <a:rPr lang="en-US" dirty="0" err="1" smtClean="0"/>
-              <a:t>thu</a:t>
-            </a:r>
-            <a:r>
-              <a:rPr lang="en-US" dirty="0" smtClean="0"/>
-              <a:t> (Tag, </a:t>
-            </a:r>
-            <a:r>
-              <a:rPr lang="en-US" dirty="0" err="1" smtClean="0"/>
-              <a:t>Pathloss</a:t>
-            </a:r>
-            <a:r>
-              <a:rPr lang="en-US" dirty="0" smtClean="0"/>
-              <a:t>, Gateway)</a:t>
-            </a:r>
-          </a:p>
-          <a:p>
-            <a:pPr algn="just"/>
-            <a:r>
-              <a:rPr lang="en-US" dirty="0" err="1" smtClean="0"/>
-              <a:t>Tìm</a:t>
-            </a:r>
-            <a:r>
-              <a:rPr lang="en-US" dirty="0" smtClean="0"/>
-              <a:t> </a:t>
-            </a:r>
-            <a:r>
-              <a:rPr lang="en-US" dirty="0" err="1" smtClean="0"/>
-              <a:t>được</a:t>
-            </a:r>
-            <a:r>
-              <a:rPr lang="en-US" dirty="0" smtClean="0"/>
-              <a:t> </a:t>
-            </a:r>
-            <a:r>
-              <a:rPr lang="en-US" dirty="0" err="1" smtClean="0"/>
-              <a:t>khoảng</a:t>
-            </a:r>
-            <a:r>
-              <a:rPr lang="en-US" dirty="0" smtClean="0"/>
-              <a:t> </a:t>
-            </a:r>
-            <a:r>
-              <a:rPr lang="en-US" dirty="0" err="1" smtClean="0"/>
-              <a:t>cách</a:t>
-            </a:r>
-            <a:r>
-              <a:rPr lang="en-US" dirty="0" smtClean="0"/>
-              <a:t> </a:t>
-            </a:r>
-            <a:r>
-              <a:rPr lang="en-US" dirty="0" err="1" smtClean="0"/>
-              <a:t>từ</a:t>
-            </a:r>
-            <a:r>
-              <a:rPr lang="en-US" dirty="0" smtClean="0"/>
-              <a:t> </a:t>
-            </a:r>
-            <a:r>
-              <a:rPr lang="en-US" dirty="0" err="1" smtClean="0"/>
-              <a:t>điểm</a:t>
-            </a:r>
-            <a:r>
-              <a:rPr lang="en-US" dirty="0" smtClean="0"/>
-              <a:t> </a:t>
-            </a:r>
-            <a:r>
-              <a:rPr lang="en-US" dirty="0" err="1" smtClean="0"/>
-              <a:t>thu</a:t>
-            </a:r>
-            <a:r>
-              <a:rPr lang="en-US" dirty="0" smtClean="0"/>
-              <a:t> </a:t>
-            </a:r>
-            <a:r>
-              <a:rPr lang="en-US" dirty="0" err="1" smtClean="0"/>
-              <a:t>đến</a:t>
-            </a:r>
-            <a:r>
-              <a:rPr lang="en-US" dirty="0" smtClean="0"/>
-              <a:t> 4 </a:t>
-            </a:r>
-            <a:r>
-              <a:rPr lang="en-US" dirty="0" err="1" smtClean="0"/>
-              <a:t>điểm</a:t>
-            </a:r>
-            <a:r>
-              <a:rPr lang="en-US" dirty="0" smtClean="0"/>
-              <a:t> </a:t>
-            </a:r>
-            <a:r>
-              <a:rPr lang="en-US" dirty="0" err="1" smtClean="0"/>
-              <a:t>phát</a:t>
-            </a:r>
-            <a:r>
-              <a:rPr lang="en-US" dirty="0" smtClean="0"/>
-              <a:t> =&gt; </a:t>
-            </a:r>
-            <a:r>
-              <a:rPr lang="en-US" dirty="0" err="1" smtClean="0"/>
-              <a:t>thành</a:t>
-            </a:r>
-            <a:r>
-              <a:rPr lang="en-US" dirty="0" smtClean="0"/>
-              <a:t> </a:t>
-            </a:r>
-            <a:r>
-              <a:rPr lang="en-US" dirty="0" err="1" smtClean="0"/>
-              <a:t>lập</a:t>
-            </a:r>
-            <a:r>
-              <a:rPr lang="en-US" dirty="0" smtClean="0"/>
-              <a:t> </a:t>
-            </a:r>
-            <a:r>
-              <a:rPr lang="en-US" dirty="0" err="1" smtClean="0"/>
-              <a:t>được</a:t>
-            </a:r>
-            <a:r>
-              <a:rPr lang="en-US" dirty="0" smtClean="0"/>
-              <a:t> </a:t>
-            </a:r>
-            <a:r>
-              <a:rPr lang="en-US" dirty="0" err="1" smtClean="0"/>
-              <a:t>hệ</a:t>
-            </a:r>
-            <a:r>
-              <a:rPr lang="en-US" dirty="0" smtClean="0"/>
-              <a:t> </a:t>
-            </a:r>
-            <a:r>
-              <a:rPr lang="en-US" dirty="0" err="1" smtClean="0"/>
-              <a:t>phương</a:t>
-            </a:r>
-            <a:r>
-              <a:rPr lang="en-US" dirty="0" smtClean="0"/>
-              <a:t> </a:t>
-            </a:r>
-            <a:r>
-              <a:rPr lang="en-US" dirty="0" err="1" smtClean="0"/>
-              <a:t>trình</a:t>
-            </a:r>
-            <a:r>
-              <a:rPr lang="en-US" dirty="0" smtClean="0"/>
-              <a:t> =&gt; </a:t>
-            </a:r>
-            <a:r>
-              <a:rPr lang="en-US" dirty="0" err="1" smtClean="0"/>
-              <a:t>tìm</a:t>
-            </a:r>
-            <a:r>
-              <a:rPr lang="en-US" dirty="0" smtClean="0"/>
-              <a:t> </a:t>
-            </a:r>
-            <a:r>
-              <a:rPr lang="en-US" dirty="0" err="1" smtClean="0"/>
-              <a:t>được</a:t>
-            </a:r>
-            <a:r>
-              <a:rPr lang="en-US" dirty="0" smtClean="0"/>
-              <a:t> </a:t>
-            </a:r>
-            <a:r>
-              <a:rPr lang="en-US" dirty="0" err="1" smtClean="0"/>
-              <a:t>vị</a:t>
-            </a:r>
-            <a:r>
-              <a:rPr lang="en-US" dirty="0" smtClean="0"/>
-              <a:t> </a:t>
-            </a:r>
-            <a:r>
-              <a:rPr lang="en-US" dirty="0" err="1" smtClean="0"/>
-              <a:t>trí</a:t>
-            </a:r>
-            <a:r>
-              <a:rPr lang="en-US" dirty="0" smtClean="0"/>
-              <a:t> </a:t>
-            </a:r>
-            <a:r>
-              <a:rPr lang="en-US" dirty="0" err="1" smtClean="0"/>
-              <a:t>của</a:t>
-            </a:r>
-            <a:r>
-              <a:rPr lang="en-US" dirty="0" smtClean="0"/>
-              <a:t> </a:t>
-            </a:r>
-            <a:r>
-              <a:rPr lang="en-US" dirty="0" err="1" smtClean="0"/>
-              <a:t>thiết</a:t>
-            </a:r>
-            <a:r>
-              <a:rPr lang="en-US" dirty="0" smtClean="0"/>
-              <a:t> </a:t>
-            </a:r>
-            <a:r>
-              <a:rPr lang="en-US" dirty="0" err="1" smtClean="0"/>
-              <a:t>bị</a:t>
-            </a:r>
-            <a:r>
-              <a:rPr lang="en-US" dirty="0" smtClean="0"/>
-              <a:t> </a:t>
-            </a:r>
-            <a:r>
-              <a:rPr lang="en-US" dirty="0" err="1" smtClean="0"/>
-              <a:t>thu</a:t>
-            </a:r>
-            <a:r>
-              <a:rPr lang="en-US" dirty="0" smtClean="0"/>
-              <a:t> </a:t>
-            </a:r>
-            <a:r>
-              <a:rPr lang="en-US" dirty="0" err="1" smtClean="0"/>
-              <a:t>nếu</a:t>
-            </a:r>
-            <a:r>
-              <a:rPr lang="en-US" dirty="0" smtClean="0"/>
-              <a:t> </a:t>
-            </a:r>
-            <a:r>
-              <a:rPr lang="en-US" dirty="0" err="1" smtClean="0"/>
-              <a:t>biết</a:t>
-            </a:r>
-            <a:r>
-              <a:rPr lang="en-US" dirty="0" smtClean="0"/>
-              <a:t> </a:t>
-            </a:r>
-            <a:r>
-              <a:rPr lang="en-US" dirty="0" err="1" smtClean="0"/>
-              <a:t>vị</a:t>
-            </a:r>
-            <a:r>
-              <a:rPr lang="en-US" dirty="0" smtClean="0"/>
-              <a:t> </a:t>
-            </a:r>
-            <a:r>
-              <a:rPr lang="en-US" dirty="0" err="1" smtClean="0"/>
-              <a:t>trí</a:t>
-            </a:r>
-            <a:r>
-              <a:rPr lang="en-US" dirty="0" smtClean="0"/>
-              <a:t> 4 </a:t>
-            </a:r>
-            <a:r>
-              <a:rPr lang="en-US" dirty="0" err="1" smtClean="0"/>
-              <a:t>thiết</a:t>
-            </a:r>
-            <a:r>
-              <a:rPr lang="en-US" dirty="0" smtClean="0"/>
-              <a:t> </a:t>
-            </a:r>
-            <a:r>
-              <a:rPr lang="en-US" dirty="0" err="1" smtClean="0"/>
-              <a:t>bị</a:t>
-            </a:r>
-            <a:r>
-              <a:rPr lang="en-US" dirty="0" smtClean="0"/>
-              <a:t> </a:t>
-            </a:r>
-            <a:r>
-              <a:rPr lang="en-US" dirty="0" err="1" smtClean="0"/>
-              <a:t>phát</a:t>
-            </a:r>
-            <a:endParaRPr lang="en-US" dirty="0"/>
-          </a:p>
-        </p:txBody>
-      </p:sp>
-      <p:sp>
-        <p:nvSpPr>
-          <p:cNvPr id="4" name="Title 1"/>
-          <p:cNvSpPr>
-            <a:spLocks noGrp="1"/>
-          </p:cNvSpPr>
-          <p:nvPr>
-            <p:ph type="title"/>
-          </p:nvPr>
-        </p:nvSpPr>
-        <p:spPr/>
-        <p:txBody>
-          <a:bodyPr/>
-          <a:lstStyle/>
-          <a:p>
-            <a:r>
-              <a:rPr lang="en-US" dirty="0" smtClean="0"/>
-              <a:t>INDOOR POSITIONING SYSTEM</a:t>
-            </a:r>
-            <a:endParaRPr lang="en-US" dirty="0"/>
-          </a:p>
-        </p:txBody>
-      </p:sp>
-    </p:spTree>
-    <p:extLst>
-      <p:ext uri="{BB962C8B-B14F-4D97-AF65-F5344CB8AC3E}">
-        <p14:creationId xmlns:p14="http://schemas.microsoft.com/office/powerpoint/2010/main" val="1127468315"/>
-      </p:ext>
-    </p:extLst>
-  </p:cSld>
-  <p:clrMapOvr>
-    <a:masterClrMapping/>
-  </p:clrMapOvr>
-</p:sld>
-</file>
-
-<file path=ppt/slides/slide20.xml><?xml version="1.0" encoding="utf-8"?>
+<file path=ppt/slides/slide23.xml><?xml version="1.0" encoding="utf-8"?>
 <p:sld xmlns:a="http://schemas.openxmlformats.org/drawingml/2006/main" xmlns:r="http://schemas.openxmlformats.org/officeDocument/2006/relationships" xmlns:p="http://schemas.openxmlformats.org/presentationml/2006/main">
   <p:cSld>
     <p:spTree>
@@ -7428,7 +8170,7 @@
 </p:sld>
 </file>
 
-<file path=ppt/slides/slide21.xml><?xml version="1.0" encoding="utf-8"?>
+<file path=ppt/slides/slide24.xml><?xml version="1.0" encoding="utf-8"?>
 <p:sld xmlns:a="http://schemas.openxmlformats.org/drawingml/2006/main" xmlns:r="http://schemas.openxmlformats.org/officeDocument/2006/relationships" xmlns:p="http://schemas.openxmlformats.org/presentationml/2006/main">
   <p:cSld>
     <p:spTree>
@@ -7796,7 +8538,7 @@
 </p:sld>
 </file>
 
-<file path=ppt/slides/slide22.xml><?xml version="1.0" encoding="utf-8"?>
+<file path=ppt/slides/slide25.xml><?xml version="1.0" encoding="utf-8"?>
 <p:sld xmlns:a="http://schemas.openxmlformats.org/drawingml/2006/main" xmlns:r="http://schemas.openxmlformats.org/officeDocument/2006/relationships" xmlns:p="http://schemas.openxmlformats.org/presentationml/2006/main">
   <p:cSld>
     <p:spTree>
@@ -8147,7 +8889,7 @@
 </p:sld>
 </file>
 
-<file path=ppt/slides/slide23.xml><?xml version="1.0" encoding="utf-8"?>
+<file path=ppt/slides/slide26.xml><?xml version="1.0" encoding="utf-8"?>
 <p:sld xmlns:a="http://schemas.openxmlformats.org/drawingml/2006/main" xmlns:r="http://schemas.openxmlformats.org/officeDocument/2006/relationships" xmlns:p="http://schemas.openxmlformats.org/presentationml/2006/main">
   <p:cSld>
     <p:spTree>
@@ -8540,7 +9282,7 @@
 </p:sld>
 </file>
 
-<file path=ppt/slides/slide24.xml><?xml version="1.0" encoding="utf-8"?>
+<file path=ppt/slides/slide27.xml><?xml version="1.0" encoding="utf-8"?>
 <p:sld xmlns:a="http://schemas.openxmlformats.org/drawingml/2006/main" xmlns:r="http://schemas.openxmlformats.org/officeDocument/2006/relationships" xmlns:p="http://schemas.openxmlformats.org/presentationml/2006/main">
   <p:cSld>
     <p:spTree>
@@ -8771,7 +9513,7 @@
 </p:sld>
 </file>
 
-<file path=ppt/slides/slide25.xml><?xml version="1.0" encoding="utf-8"?>
+<file path=ppt/slides/slide28.xml><?xml version="1.0" encoding="utf-8"?>
 <p:sld xmlns:a="http://schemas.openxmlformats.org/drawingml/2006/main" xmlns:r="http://schemas.openxmlformats.org/officeDocument/2006/relationships" xmlns:p="http://schemas.openxmlformats.org/presentationml/2006/main">
   <p:cSld>
     <p:spTree>
@@ -8911,7 +9653,7 @@
 </p:sld>
 </file>
 
-<file path=ppt/slides/slide26.xml><?xml version="1.0" encoding="utf-8"?>
+<file path=ppt/slides/slide29.xml><?xml version="1.0" encoding="utf-8"?>
 <p:sld xmlns:a="http://schemas.openxmlformats.org/drawingml/2006/main" xmlns:r="http://schemas.openxmlformats.org/officeDocument/2006/relationships" xmlns:p="http://schemas.openxmlformats.org/presentationml/2006/main">
   <p:cSld>
     <p:spTree>
@@ -9046,501 +9788,6 @@
     <p:extLst>
       <p:ext uri="{BB962C8B-B14F-4D97-AF65-F5344CB8AC3E}">
         <p14:creationId xmlns:p14="http://schemas.microsoft.com/office/powerpoint/2010/main" val="95956669"/>
-      </p:ext>
-    </p:extLst>
-  </p:cSld>
-  <p:clrMapOvr>
-    <a:masterClrMapping/>
-  </p:clrMapOvr>
-</p:sld>
-</file>
-
-<file path=ppt/slides/slide27.xml><?xml version="1.0" encoding="utf-8"?>
-<p:sld xmlns:a="http://schemas.openxmlformats.org/drawingml/2006/main" xmlns:r="http://schemas.openxmlformats.org/officeDocument/2006/relationships" xmlns:p="http://schemas.openxmlformats.org/presentationml/2006/main">
-  <p:cSld>
-    <p:spTree>
-      <p:nvGrpSpPr>
-        <p:cNvPr id="1" name=""/>
-        <p:cNvGrpSpPr/>
-        <p:nvPr/>
-      </p:nvGrpSpPr>
-      <p:grpSpPr>
-        <a:xfrm>
-          <a:off x="0" y="0"/>
-          <a:ext cx="0" cy="0"/>
-          <a:chOff x="0" y="0"/>
-          <a:chExt cx="0" cy="0"/>
-        </a:xfrm>
-      </p:grpSpPr>
-      <p:sp>
-        <p:nvSpPr>
-          <p:cNvPr id="2" name="Title 1"/>
-          <p:cNvSpPr>
-            <a:spLocks noGrp="1"/>
-          </p:cNvSpPr>
-          <p:nvPr>
-            <p:ph type="title"/>
-          </p:nvPr>
-        </p:nvSpPr>
-        <p:spPr/>
-        <p:txBody>
-          <a:bodyPr/>
-          <a:lstStyle/>
-          <a:p>
-            <a:r>
-              <a:rPr lang="en-US" dirty="0"/>
-              <a:t>2020.04.24: Antenna Compare</a:t>
-            </a:r>
-          </a:p>
-        </p:txBody>
-      </p:sp>
-      <p:sp>
-        <p:nvSpPr>
-          <p:cNvPr id="3" name="Content Placeholder 2"/>
-          <p:cNvSpPr>
-            <a:spLocks noGrp="1"/>
-          </p:cNvSpPr>
-          <p:nvPr>
-            <p:ph idx="1"/>
-          </p:nvPr>
-        </p:nvSpPr>
-        <p:spPr/>
-        <p:txBody>
-          <a:bodyPr>
-            <a:normAutofit/>
-          </a:bodyPr>
-          <a:lstStyle/>
-          <a:p>
-            <a:pPr algn="just"/>
-            <a:r>
-              <a:rPr lang="en-US" dirty="0" smtClean="0"/>
-              <a:t>Antenna </a:t>
-            </a:r>
-            <a:r>
-              <a:rPr lang="en-US" dirty="0" err="1" smtClean="0"/>
-              <a:t>ngắn</a:t>
-            </a:r>
-            <a:r>
-              <a:rPr lang="en-US" dirty="0" smtClean="0"/>
-              <a:t> </a:t>
-            </a:r>
-            <a:r>
-              <a:rPr lang="en-US" dirty="0" err="1" smtClean="0"/>
-              <a:t>đọc</a:t>
-            </a:r>
-            <a:r>
-              <a:rPr lang="en-US" dirty="0" smtClean="0"/>
-              <a:t> </a:t>
-            </a:r>
-            <a:r>
-              <a:rPr lang="en-US" dirty="0" err="1" smtClean="0"/>
-              <a:t>yếu</a:t>
-            </a:r>
-            <a:r>
-              <a:rPr lang="en-US" dirty="0" smtClean="0"/>
-              <a:t> </a:t>
-            </a:r>
-            <a:r>
-              <a:rPr lang="en-US" dirty="0" err="1" smtClean="0"/>
-              <a:t>nhất</a:t>
-            </a:r>
-            <a:r>
-              <a:rPr lang="en-US" dirty="0" smtClean="0"/>
-              <a:t>, antenna </a:t>
-            </a:r>
-            <a:r>
-              <a:rPr lang="en-US" dirty="0" err="1" smtClean="0"/>
-              <a:t>dài</a:t>
-            </a:r>
-            <a:r>
-              <a:rPr lang="en-US" dirty="0" smtClean="0"/>
-              <a:t> </a:t>
-            </a:r>
-            <a:r>
-              <a:rPr lang="en-US" dirty="0" err="1" smtClean="0"/>
-              <a:t>đọc</a:t>
-            </a:r>
-            <a:r>
-              <a:rPr lang="en-US" dirty="0" smtClean="0"/>
-              <a:t> </a:t>
-            </a:r>
-            <a:r>
-              <a:rPr lang="en-US" dirty="0" err="1" smtClean="0"/>
-              <a:t>mạnh</a:t>
-            </a:r>
-            <a:r>
-              <a:rPr lang="en-US" dirty="0" smtClean="0"/>
-              <a:t> </a:t>
-            </a:r>
-            <a:r>
-              <a:rPr lang="en-US" dirty="0" err="1" smtClean="0"/>
-              <a:t>nhất</a:t>
-            </a:r>
-            <a:r>
-              <a:rPr lang="en-US" dirty="0" smtClean="0"/>
-              <a:t>.</a:t>
-            </a:r>
-          </a:p>
-          <a:p>
-            <a:pPr algn="just"/>
-            <a:r>
-              <a:rPr lang="en-US" dirty="0" smtClean="0"/>
-              <a:t>Antenna </a:t>
-            </a:r>
-            <a:r>
-              <a:rPr lang="en-US" dirty="0" err="1" smtClean="0"/>
-              <a:t>dài</a:t>
-            </a:r>
-            <a:r>
-              <a:rPr lang="en-US" dirty="0" smtClean="0"/>
-              <a:t> </a:t>
-            </a:r>
-            <a:r>
-              <a:rPr lang="en-US" dirty="0" err="1" smtClean="0"/>
-              <a:t>có</a:t>
-            </a:r>
-            <a:r>
-              <a:rPr lang="en-US" dirty="0" smtClean="0"/>
-              <a:t> </a:t>
-            </a:r>
-            <a:r>
-              <a:rPr lang="en-US" dirty="0" err="1" smtClean="0"/>
-              <a:t>phổ</a:t>
-            </a:r>
-            <a:r>
-              <a:rPr lang="en-US" dirty="0" smtClean="0"/>
-              <a:t> </a:t>
-            </a:r>
-            <a:r>
-              <a:rPr lang="en-US" dirty="0" err="1" smtClean="0"/>
-              <a:t>nhỏ</a:t>
-            </a:r>
-            <a:r>
-              <a:rPr lang="en-US" dirty="0" smtClean="0"/>
-              <a:t> </a:t>
-            </a:r>
-            <a:r>
-              <a:rPr lang="en-US" dirty="0" err="1" smtClean="0"/>
-              <a:t>hơn</a:t>
-            </a:r>
-            <a:r>
-              <a:rPr lang="en-US" dirty="0" smtClean="0"/>
-              <a:t> =&gt; </a:t>
-            </a:r>
-            <a:r>
-              <a:rPr lang="en-US" dirty="0" err="1" smtClean="0"/>
-              <a:t>ổn</a:t>
-            </a:r>
-            <a:r>
-              <a:rPr lang="en-US" dirty="0" smtClean="0"/>
-              <a:t> </a:t>
-            </a:r>
-            <a:r>
-              <a:rPr lang="en-US" dirty="0" err="1" smtClean="0"/>
-              <a:t>định</a:t>
-            </a:r>
-            <a:r>
-              <a:rPr lang="en-US" dirty="0" smtClean="0"/>
-              <a:t> </a:t>
-            </a:r>
-            <a:r>
-              <a:rPr lang="en-US" dirty="0" err="1" smtClean="0"/>
-              <a:t>hơn</a:t>
-            </a:r>
-            <a:endParaRPr lang="en-US" dirty="0" smtClean="0"/>
-          </a:p>
-          <a:p>
-            <a:pPr algn="just"/>
-            <a:r>
-              <a:rPr lang="en-US" dirty="0" err="1" smtClean="0"/>
-              <a:t>Khi</a:t>
-            </a:r>
-            <a:r>
-              <a:rPr lang="en-US" dirty="0" smtClean="0"/>
-              <a:t> </a:t>
-            </a:r>
-            <a:r>
-              <a:rPr lang="en-US" dirty="0" err="1" smtClean="0"/>
-              <a:t>áp</a:t>
-            </a:r>
-            <a:r>
-              <a:rPr lang="en-US" dirty="0" smtClean="0"/>
-              <a:t> </a:t>
-            </a:r>
-            <a:r>
-              <a:rPr lang="en-US" dirty="0" err="1" smtClean="0"/>
-              <a:t>dụng</a:t>
-            </a:r>
-            <a:r>
-              <a:rPr lang="en-US" dirty="0" smtClean="0"/>
-              <a:t> </a:t>
-            </a:r>
-            <a:r>
-              <a:rPr lang="en-US" dirty="0" err="1" smtClean="0"/>
-              <a:t>Kalman</a:t>
-            </a:r>
-            <a:r>
-              <a:rPr lang="en-US" dirty="0" smtClean="0"/>
-              <a:t>, Antenna </a:t>
-            </a:r>
-            <a:r>
-              <a:rPr lang="en-US" dirty="0" err="1" smtClean="0"/>
-              <a:t>dài</a:t>
-            </a:r>
-            <a:r>
-              <a:rPr lang="en-US" dirty="0" smtClean="0"/>
-              <a:t> </a:t>
-            </a:r>
-            <a:r>
-              <a:rPr lang="en-US" dirty="0" err="1" smtClean="0"/>
-              <a:t>thích</a:t>
-            </a:r>
-            <a:r>
-              <a:rPr lang="en-US" dirty="0" smtClean="0"/>
-              <a:t> </a:t>
-            </a:r>
-            <a:r>
-              <a:rPr lang="en-US" dirty="0" err="1" smtClean="0"/>
-              <a:t>hợp</a:t>
-            </a:r>
-            <a:r>
-              <a:rPr lang="en-US" dirty="0" smtClean="0"/>
-              <a:t> </a:t>
-            </a:r>
-            <a:r>
-              <a:rPr lang="en-US" dirty="0" err="1" smtClean="0"/>
-              <a:t>cho</a:t>
-            </a:r>
-            <a:r>
-              <a:rPr lang="en-US" dirty="0" smtClean="0"/>
-              <a:t> </a:t>
-            </a:r>
-            <a:r>
-              <a:rPr lang="en-US" dirty="0" err="1" smtClean="0"/>
-              <a:t>việc</a:t>
-            </a:r>
-            <a:r>
-              <a:rPr lang="en-US" dirty="0" smtClean="0"/>
-              <a:t> </a:t>
-            </a:r>
-            <a:r>
-              <a:rPr lang="en-US" dirty="0" err="1" smtClean="0"/>
-              <a:t>tăng</a:t>
-            </a:r>
-            <a:r>
-              <a:rPr lang="en-US" dirty="0" smtClean="0"/>
-              <a:t> </a:t>
-            </a:r>
-            <a:r>
-              <a:rPr lang="en-US" dirty="0" err="1" smtClean="0"/>
-              <a:t>độ</a:t>
-            </a:r>
-            <a:r>
-              <a:rPr lang="en-US" dirty="0" smtClean="0"/>
-              <a:t> </a:t>
-            </a:r>
-            <a:r>
-              <a:rPr lang="en-US" dirty="0" err="1" smtClean="0"/>
-              <a:t>ổn</a:t>
-            </a:r>
-            <a:r>
-              <a:rPr lang="en-US" dirty="0" smtClean="0"/>
-              <a:t> </a:t>
-            </a:r>
-            <a:r>
-              <a:rPr lang="en-US" dirty="0" err="1" smtClean="0"/>
-              <a:t>định</a:t>
-            </a:r>
-            <a:r>
-              <a:rPr lang="en-US" dirty="0" smtClean="0"/>
-              <a:t>.</a:t>
-            </a:r>
-          </a:p>
-          <a:p>
-            <a:pPr algn="just"/>
-            <a:r>
-              <a:rPr lang="en-US" dirty="0" smtClean="0"/>
-              <a:t>Antenna </a:t>
-            </a:r>
-            <a:r>
-              <a:rPr lang="en-US" dirty="0" err="1" smtClean="0"/>
-              <a:t>dài</a:t>
-            </a:r>
-            <a:r>
-              <a:rPr lang="en-US" dirty="0" smtClean="0"/>
-              <a:t> </a:t>
-            </a:r>
-            <a:r>
-              <a:rPr lang="en-US" dirty="0" err="1" smtClean="0"/>
-              <a:t>nặng</a:t>
-            </a:r>
-            <a:r>
-              <a:rPr lang="en-US" dirty="0" smtClean="0"/>
-              <a:t> </a:t>
-            </a:r>
-            <a:r>
-              <a:rPr lang="en-US" dirty="0" err="1" smtClean="0"/>
-              <a:t>và</a:t>
-            </a:r>
-            <a:r>
-              <a:rPr lang="en-US" dirty="0" smtClean="0"/>
-              <a:t> </a:t>
-            </a:r>
-            <a:r>
-              <a:rPr lang="en-US" dirty="0" err="1" smtClean="0"/>
-              <a:t>lớn</a:t>
-            </a:r>
-            <a:r>
-              <a:rPr lang="en-US" dirty="0" smtClean="0"/>
-              <a:t>, </a:t>
-            </a:r>
-            <a:r>
-              <a:rPr lang="en-US" dirty="0" err="1" smtClean="0"/>
-              <a:t>khó</a:t>
-            </a:r>
-            <a:r>
-              <a:rPr lang="en-US" dirty="0" smtClean="0"/>
-              <a:t> </a:t>
-            </a:r>
-            <a:r>
-              <a:rPr lang="en-US" dirty="0" err="1" smtClean="0"/>
-              <a:t>lắp</a:t>
-            </a:r>
-            <a:r>
-              <a:rPr lang="en-US" dirty="0" smtClean="0"/>
-              <a:t> </a:t>
-            </a:r>
-            <a:r>
-              <a:rPr lang="en-US" dirty="0" err="1" smtClean="0"/>
-              <a:t>đặt</a:t>
-            </a:r>
-            <a:r>
-              <a:rPr lang="en-US" dirty="0" smtClean="0"/>
-              <a:t>.</a:t>
-            </a:r>
-          </a:p>
-          <a:p>
-            <a:pPr algn="just"/>
-            <a:r>
-              <a:rPr lang="en-US" dirty="0" smtClean="0"/>
-              <a:t>=&gt; </a:t>
-            </a:r>
-            <a:r>
-              <a:rPr lang="en-US" dirty="0" err="1" smtClean="0"/>
-              <a:t>sử</a:t>
-            </a:r>
-            <a:r>
-              <a:rPr lang="en-US" dirty="0" smtClean="0"/>
-              <a:t> </a:t>
-            </a:r>
-            <a:r>
-              <a:rPr lang="en-US" dirty="0" err="1" smtClean="0"/>
-              <a:t>dụng</a:t>
-            </a:r>
-            <a:r>
-              <a:rPr lang="en-US" dirty="0" smtClean="0"/>
-              <a:t> antenna </a:t>
-            </a:r>
-            <a:r>
-              <a:rPr lang="en-US" dirty="0" err="1" smtClean="0"/>
-              <a:t>trung</a:t>
-            </a:r>
-            <a:r>
-              <a:rPr lang="en-US" dirty="0" smtClean="0"/>
-              <a:t> </a:t>
-            </a:r>
-            <a:r>
-              <a:rPr lang="en-US" dirty="0" err="1" smtClean="0"/>
-              <a:t>bình</a:t>
-            </a:r>
-            <a:r>
-              <a:rPr lang="en-US" dirty="0" smtClean="0"/>
-              <a:t> </a:t>
-            </a:r>
-            <a:r>
-              <a:rPr lang="en-US" dirty="0" err="1" smtClean="0"/>
-              <a:t>hoặc</a:t>
-            </a:r>
-            <a:r>
-              <a:rPr lang="en-US" dirty="0" smtClean="0"/>
-              <a:t> antenna </a:t>
-            </a:r>
-            <a:r>
-              <a:rPr lang="en-US" dirty="0" err="1" smtClean="0"/>
-              <a:t>dài</a:t>
-            </a:r>
-            <a:r>
-              <a:rPr lang="en-US" dirty="0" smtClean="0"/>
-              <a:t> </a:t>
-            </a:r>
-            <a:r>
-              <a:rPr lang="en-US" dirty="0" err="1" smtClean="0"/>
-              <a:t>nếu</a:t>
-            </a:r>
-            <a:r>
-              <a:rPr lang="en-US" dirty="0" smtClean="0"/>
-              <a:t> </a:t>
-            </a:r>
-            <a:r>
-              <a:rPr lang="en-US" dirty="0" err="1" smtClean="0"/>
-              <a:t>có</a:t>
-            </a:r>
-            <a:r>
-              <a:rPr lang="en-US" dirty="0" smtClean="0"/>
-              <a:t> </a:t>
-            </a:r>
-            <a:r>
-              <a:rPr lang="en-US" dirty="0" err="1" smtClean="0"/>
-              <a:t>phương</a:t>
-            </a:r>
-            <a:r>
-              <a:rPr lang="en-US" dirty="0" smtClean="0"/>
-              <a:t> </a:t>
-            </a:r>
-            <a:r>
-              <a:rPr lang="en-US" dirty="0" err="1" smtClean="0"/>
-              <a:t>pháp</a:t>
-            </a:r>
-            <a:r>
-              <a:rPr lang="en-US" dirty="0" smtClean="0"/>
-              <a:t> </a:t>
-            </a:r>
-            <a:r>
-              <a:rPr lang="en-US" dirty="0" err="1" smtClean="0"/>
-              <a:t>lắp</a:t>
-            </a:r>
-            <a:r>
-              <a:rPr lang="en-US" dirty="0" smtClean="0"/>
-              <a:t> </a:t>
-            </a:r>
-            <a:r>
-              <a:rPr lang="en-US" dirty="0" err="1" smtClean="0"/>
-              <a:t>đặt</a:t>
-            </a:r>
-            <a:r>
-              <a:rPr lang="en-US" dirty="0" smtClean="0"/>
-              <a:t> </a:t>
-            </a:r>
-            <a:r>
-              <a:rPr lang="en-US" dirty="0" err="1" smtClean="0"/>
-              <a:t>hợp</a:t>
-            </a:r>
-            <a:r>
-              <a:rPr lang="en-US" dirty="0" smtClean="0"/>
-              <a:t> </a:t>
-            </a:r>
-            <a:r>
-              <a:rPr lang="en-US" dirty="0" err="1" smtClean="0"/>
-              <a:t>lý</a:t>
-            </a:r>
-            <a:endParaRPr lang="en-US" dirty="0"/>
-          </a:p>
-        </p:txBody>
-      </p:sp>
-    </p:spTree>
-    <p:extLst>
-      <p:ext uri="{BB962C8B-B14F-4D97-AF65-F5344CB8AC3E}">
-        <p14:creationId xmlns:p14="http://schemas.microsoft.com/office/powerpoint/2010/main" val="1949196504"/>
       </p:ext>
     </p:extLst>
   </p:cSld>
@@ -9793,6 +10040,501 @@
     <p:extLst>
       <p:ext uri="{BB962C8B-B14F-4D97-AF65-F5344CB8AC3E}">
         <p14:creationId xmlns:p14="http://schemas.microsoft.com/office/powerpoint/2010/main" val="372981873"/>
+      </p:ext>
+    </p:extLst>
+  </p:cSld>
+  <p:clrMapOvr>
+    <a:masterClrMapping/>
+  </p:clrMapOvr>
+</p:sld>
+</file>
+
+<file path=ppt/slides/slide30.xml><?xml version="1.0" encoding="utf-8"?>
+<p:sld xmlns:a="http://schemas.openxmlformats.org/drawingml/2006/main" xmlns:r="http://schemas.openxmlformats.org/officeDocument/2006/relationships" xmlns:p="http://schemas.openxmlformats.org/presentationml/2006/main">
+  <p:cSld>
+    <p:spTree>
+      <p:nvGrpSpPr>
+        <p:cNvPr id="1" name=""/>
+        <p:cNvGrpSpPr/>
+        <p:nvPr/>
+      </p:nvGrpSpPr>
+      <p:grpSpPr>
+        <a:xfrm>
+          <a:off x="0" y="0"/>
+          <a:ext cx="0" cy="0"/>
+          <a:chOff x="0" y="0"/>
+          <a:chExt cx="0" cy="0"/>
+        </a:xfrm>
+      </p:grpSpPr>
+      <p:sp>
+        <p:nvSpPr>
+          <p:cNvPr id="2" name="Title 1"/>
+          <p:cNvSpPr>
+            <a:spLocks noGrp="1"/>
+          </p:cNvSpPr>
+          <p:nvPr>
+            <p:ph type="title"/>
+          </p:nvPr>
+        </p:nvSpPr>
+        <p:spPr/>
+        <p:txBody>
+          <a:bodyPr/>
+          <a:lstStyle/>
+          <a:p>
+            <a:r>
+              <a:rPr lang="en-US" dirty="0"/>
+              <a:t>2020.04.24: Antenna Compare</a:t>
+            </a:r>
+          </a:p>
+        </p:txBody>
+      </p:sp>
+      <p:sp>
+        <p:nvSpPr>
+          <p:cNvPr id="3" name="Content Placeholder 2"/>
+          <p:cNvSpPr>
+            <a:spLocks noGrp="1"/>
+          </p:cNvSpPr>
+          <p:nvPr>
+            <p:ph idx="1"/>
+          </p:nvPr>
+        </p:nvSpPr>
+        <p:spPr/>
+        <p:txBody>
+          <a:bodyPr>
+            <a:normAutofit/>
+          </a:bodyPr>
+          <a:lstStyle/>
+          <a:p>
+            <a:pPr algn="just"/>
+            <a:r>
+              <a:rPr lang="en-US" dirty="0" smtClean="0"/>
+              <a:t>Antenna </a:t>
+            </a:r>
+            <a:r>
+              <a:rPr lang="en-US" dirty="0" err="1" smtClean="0"/>
+              <a:t>ngắn</a:t>
+            </a:r>
+            <a:r>
+              <a:rPr lang="en-US" dirty="0" smtClean="0"/>
+              <a:t> </a:t>
+            </a:r>
+            <a:r>
+              <a:rPr lang="en-US" dirty="0" err="1" smtClean="0"/>
+              <a:t>đọc</a:t>
+            </a:r>
+            <a:r>
+              <a:rPr lang="en-US" dirty="0" smtClean="0"/>
+              <a:t> </a:t>
+            </a:r>
+            <a:r>
+              <a:rPr lang="en-US" dirty="0" err="1" smtClean="0"/>
+              <a:t>yếu</a:t>
+            </a:r>
+            <a:r>
+              <a:rPr lang="en-US" dirty="0" smtClean="0"/>
+              <a:t> </a:t>
+            </a:r>
+            <a:r>
+              <a:rPr lang="en-US" dirty="0" err="1" smtClean="0"/>
+              <a:t>nhất</a:t>
+            </a:r>
+            <a:r>
+              <a:rPr lang="en-US" dirty="0" smtClean="0"/>
+              <a:t>, antenna </a:t>
+            </a:r>
+            <a:r>
+              <a:rPr lang="en-US" dirty="0" err="1" smtClean="0"/>
+              <a:t>dài</a:t>
+            </a:r>
+            <a:r>
+              <a:rPr lang="en-US" dirty="0" smtClean="0"/>
+              <a:t> </a:t>
+            </a:r>
+            <a:r>
+              <a:rPr lang="en-US" dirty="0" err="1" smtClean="0"/>
+              <a:t>đọc</a:t>
+            </a:r>
+            <a:r>
+              <a:rPr lang="en-US" dirty="0" smtClean="0"/>
+              <a:t> </a:t>
+            </a:r>
+            <a:r>
+              <a:rPr lang="en-US" dirty="0" err="1" smtClean="0"/>
+              <a:t>mạnh</a:t>
+            </a:r>
+            <a:r>
+              <a:rPr lang="en-US" dirty="0" smtClean="0"/>
+              <a:t> </a:t>
+            </a:r>
+            <a:r>
+              <a:rPr lang="en-US" dirty="0" err="1" smtClean="0"/>
+              <a:t>nhất</a:t>
+            </a:r>
+            <a:r>
+              <a:rPr lang="en-US" dirty="0" smtClean="0"/>
+              <a:t>.</a:t>
+            </a:r>
+          </a:p>
+          <a:p>
+            <a:pPr algn="just"/>
+            <a:r>
+              <a:rPr lang="en-US" dirty="0" smtClean="0"/>
+              <a:t>Antenna </a:t>
+            </a:r>
+            <a:r>
+              <a:rPr lang="en-US" dirty="0" err="1" smtClean="0"/>
+              <a:t>dài</a:t>
+            </a:r>
+            <a:r>
+              <a:rPr lang="en-US" dirty="0" smtClean="0"/>
+              <a:t> </a:t>
+            </a:r>
+            <a:r>
+              <a:rPr lang="en-US" dirty="0" err="1" smtClean="0"/>
+              <a:t>có</a:t>
+            </a:r>
+            <a:r>
+              <a:rPr lang="en-US" dirty="0" smtClean="0"/>
+              <a:t> </a:t>
+            </a:r>
+            <a:r>
+              <a:rPr lang="en-US" dirty="0" err="1" smtClean="0"/>
+              <a:t>phổ</a:t>
+            </a:r>
+            <a:r>
+              <a:rPr lang="en-US" dirty="0" smtClean="0"/>
+              <a:t> </a:t>
+            </a:r>
+            <a:r>
+              <a:rPr lang="en-US" dirty="0" err="1" smtClean="0"/>
+              <a:t>nhỏ</a:t>
+            </a:r>
+            <a:r>
+              <a:rPr lang="en-US" dirty="0" smtClean="0"/>
+              <a:t> </a:t>
+            </a:r>
+            <a:r>
+              <a:rPr lang="en-US" dirty="0" err="1" smtClean="0"/>
+              <a:t>hơn</a:t>
+            </a:r>
+            <a:r>
+              <a:rPr lang="en-US" dirty="0" smtClean="0"/>
+              <a:t> =&gt; </a:t>
+            </a:r>
+            <a:r>
+              <a:rPr lang="en-US" dirty="0" err="1" smtClean="0"/>
+              <a:t>ổn</a:t>
+            </a:r>
+            <a:r>
+              <a:rPr lang="en-US" dirty="0" smtClean="0"/>
+              <a:t> </a:t>
+            </a:r>
+            <a:r>
+              <a:rPr lang="en-US" dirty="0" err="1" smtClean="0"/>
+              <a:t>định</a:t>
+            </a:r>
+            <a:r>
+              <a:rPr lang="en-US" dirty="0" smtClean="0"/>
+              <a:t> </a:t>
+            </a:r>
+            <a:r>
+              <a:rPr lang="en-US" dirty="0" err="1" smtClean="0"/>
+              <a:t>hơn</a:t>
+            </a:r>
+            <a:endParaRPr lang="en-US" dirty="0" smtClean="0"/>
+          </a:p>
+          <a:p>
+            <a:pPr algn="just"/>
+            <a:r>
+              <a:rPr lang="en-US" dirty="0" err="1" smtClean="0"/>
+              <a:t>Khi</a:t>
+            </a:r>
+            <a:r>
+              <a:rPr lang="en-US" dirty="0" smtClean="0"/>
+              <a:t> </a:t>
+            </a:r>
+            <a:r>
+              <a:rPr lang="en-US" dirty="0" err="1" smtClean="0"/>
+              <a:t>áp</a:t>
+            </a:r>
+            <a:r>
+              <a:rPr lang="en-US" dirty="0" smtClean="0"/>
+              <a:t> </a:t>
+            </a:r>
+            <a:r>
+              <a:rPr lang="en-US" dirty="0" err="1" smtClean="0"/>
+              <a:t>dụng</a:t>
+            </a:r>
+            <a:r>
+              <a:rPr lang="en-US" dirty="0" smtClean="0"/>
+              <a:t> </a:t>
+            </a:r>
+            <a:r>
+              <a:rPr lang="en-US" dirty="0" err="1" smtClean="0"/>
+              <a:t>Kalman</a:t>
+            </a:r>
+            <a:r>
+              <a:rPr lang="en-US" dirty="0" smtClean="0"/>
+              <a:t>, Antenna </a:t>
+            </a:r>
+            <a:r>
+              <a:rPr lang="en-US" dirty="0" err="1" smtClean="0"/>
+              <a:t>dài</a:t>
+            </a:r>
+            <a:r>
+              <a:rPr lang="en-US" dirty="0" smtClean="0"/>
+              <a:t> </a:t>
+            </a:r>
+            <a:r>
+              <a:rPr lang="en-US" dirty="0" err="1" smtClean="0"/>
+              <a:t>thích</a:t>
+            </a:r>
+            <a:r>
+              <a:rPr lang="en-US" dirty="0" smtClean="0"/>
+              <a:t> </a:t>
+            </a:r>
+            <a:r>
+              <a:rPr lang="en-US" dirty="0" err="1" smtClean="0"/>
+              <a:t>hợp</a:t>
+            </a:r>
+            <a:r>
+              <a:rPr lang="en-US" dirty="0" smtClean="0"/>
+              <a:t> </a:t>
+            </a:r>
+            <a:r>
+              <a:rPr lang="en-US" dirty="0" err="1" smtClean="0"/>
+              <a:t>cho</a:t>
+            </a:r>
+            <a:r>
+              <a:rPr lang="en-US" dirty="0" smtClean="0"/>
+              <a:t> </a:t>
+            </a:r>
+            <a:r>
+              <a:rPr lang="en-US" dirty="0" err="1" smtClean="0"/>
+              <a:t>việc</a:t>
+            </a:r>
+            <a:r>
+              <a:rPr lang="en-US" dirty="0" smtClean="0"/>
+              <a:t> </a:t>
+            </a:r>
+            <a:r>
+              <a:rPr lang="en-US" dirty="0" err="1" smtClean="0"/>
+              <a:t>tăng</a:t>
+            </a:r>
+            <a:r>
+              <a:rPr lang="en-US" dirty="0" smtClean="0"/>
+              <a:t> </a:t>
+            </a:r>
+            <a:r>
+              <a:rPr lang="en-US" dirty="0" err="1" smtClean="0"/>
+              <a:t>độ</a:t>
+            </a:r>
+            <a:r>
+              <a:rPr lang="en-US" dirty="0" smtClean="0"/>
+              <a:t> </a:t>
+            </a:r>
+            <a:r>
+              <a:rPr lang="en-US" dirty="0" err="1" smtClean="0"/>
+              <a:t>ổn</a:t>
+            </a:r>
+            <a:r>
+              <a:rPr lang="en-US" dirty="0" smtClean="0"/>
+              <a:t> </a:t>
+            </a:r>
+            <a:r>
+              <a:rPr lang="en-US" dirty="0" err="1" smtClean="0"/>
+              <a:t>định</a:t>
+            </a:r>
+            <a:r>
+              <a:rPr lang="en-US" dirty="0" smtClean="0"/>
+              <a:t>.</a:t>
+            </a:r>
+          </a:p>
+          <a:p>
+            <a:pPr algn="just"/>
+            <a:r>
+              <a:rPr lang="en-US" dirty="0" smtClean="0"/>
+              <a:t>Antenna </a:t>
+            </a:r>
+            <a:r>
+              <a:rPr lang="en-US" dirty="0" err="1" smtClean="0"/>
+              <a:t>dài</a:t>
+            </a:r>
+            <a:r>
+              <a:rPr lang="en-US" dirty="0" smtClean="0"/>
+              <a:t> </a:t>
+            </a:r>
+            <a:r>
+              <a:rPr lang="en-US" dirty="0" err="1" smtClean="0"/>
+              <a:t>nặng</a:t>
+            </a:r>
+            <a:r>
+              <a:rPr lang="en-US" dirty="0" smtClean="0"/>
+              <a:t> </a:t>
+            </a:r>
+            <a:r>
+              <a:rPr lang="en-US" dirty="0" err="1" smtClean="0"/>
+              <a:t>và</a:t>
+            </a:r>
+            <a:r>
+              <a:rPr lang="en-US" dirty="0" smtClean="0"/>
+              <a:t> </a:t>
+            </a:r>
+            <a:r>
+              <a:rPr lang="en-US" dirty="0" err="1" smtClean="0"/>
+              <a:t>lớn</a:t>
+            </a:r>
+            <a:r>
+              <a:rPr lang="en-US" dirty="0" smtClean="0"/>
+              <a:t>, </a:t>
+            </a:r>
+            <a:r>
+              <a:rPr lang="en-US" dirty="0" err="1" smtClean="0"/>
+              <a:t>khó</a:t>
+            </a:r>
+            <a:r>
+              <a:rPr lang="en-US" dirty="0" smtClean="0"/>
+              <a:t> </a:t>
+            </a:r>
+            <a:r>
+              <a:rPr lang="en-US" dirty="0" err="1" smtClean="0"/>
+              <a:t>lắp</a:t>
+            </a:r>
+            <a:r>
+              <a:rPr lang="en-US" dirty="0" smtClean="0"/>
+              <a:t> </a:t>
+            </a:r>
+            <a:r>
+              <a:rPr lang="en-US" dirty="0" err="1" smtClean="0"/>
+              <a:t>đặt</a:t>
+            </a:r>
+            <a:r>
+              <a:rPr lang="en-US" dirty="0" smtClean="0"/>
+              <a:t>.</a:t>
+            </a:r>
+          </a:p>
+          <a:p>
+            <a:pPr algn="just"/>
+            <a:r>
+              <a:rPr lang="en-US" dirty="0" smtClean="0"/>
+              <a:t>=&gt; </a:t>
+            </a:r>
+            <a:r>
+              <a:rPr lang="en-US" dirty="0" err="1" smtClean="0"/>
+              <a:t>sử</a:t>
+            </a:r>
+            <a:r>
+              <a:rPr lang="en-US" dirty="0" smtClean="0"/>
+              <a:t> </a:t>
+            </a:r>
+            <a:r>
+              <a:rPr lang="en-US" dirty="0" err="1" smtClean="0"/>
+              <a:t>dụng</a:t>
+            </a:r>
+            <a:r>
+              <a:rPr lang="en-US" dirty="0" smtClean="0"/>
+              <a:t> antenna </a:t>
+            </a:r>
+            <a:r>
+              <a:rPr lang="en-US" dirty="0" err="1" smtClean="0"/>
+              <a:t>trung</a:t>
+            </a:r>
+            <a:r>
+              <a:rPr lang="en-US" dirty="0" smtClean="0"/>
+              <a:t> </a:t>
+            </a:r>
+            <a:r>
+              <a:rPr lang="en-US" dirty="0" err="1" smtClean="0"/>
+              <a:t>bình</a:t>
+            </a:r>
+            <a:r>
+              <a:rPr lang="en-US" dirty="0" smtClean="0"/>
+              <a:t> </a:t>
+            </a:r>
+            <a:r>
+              <a:rPr lang="en-US" dirty="0" err="1" smtClean="0"/>
+              <a:t>hoặc</a:t>
+            </a:r>
+            <a:r>
+              <a:rPr lang="en-US" dirty="0" smtClean="0"/>
+              <a:t> antenna </a:t>
+            </a:r>
+            <a:r>
+              <a:rPr lang="en-US" dirty="0" err="1" smtClean="0"/>
+              <a:t>dài</a:t>
+            </a:r>
+            <a:r>
+              <a:rPr lang="en-US" dirty="0" smtClean="0"/>
+              <a:t> </a:t>
+            </a:r>
+            <a:r>
+              <a:rPr lang="en-US" dirty="0" err="1" smtClean="0"/>
+              <a:t>nếu</a:t>
+            </a:r>
+            <a:r>
+              <a:rPr lang="en-US" dirty="0" smtClean="0"/>
+              <a:t> </a:t>
+            </a:r>
+            <a:r>
+              <a:rPr lang="en-US" dirty="0" err="1" smtClean="0"/>
+              <a:t>có</a:t>
+            </a:r>
+            <a:r>
+              <a:rPr lang="en-US" dirty="0" smtClean="0"/>
+              <a:t> </a:t>
+            </a:r>
+            <a:r>
+              <a:rPr lang="en-US" dirty="0" err="1" smtClean="0"/>
+              <a:t>phương</a:t>
+            </a:r>
+            <a:r>
+              <a:rPr lang="en-US" dirty="0" smtClean="0"/>
+              <a:t> </a:t>
+            </a:r>
+            <a:r>
+              <a:rPr lang="en-US" dirty="0" err="1" smtClean="0"/>
+              <a:t>pháp</a:t>
+            </a:r>
+            <a:r>
+              <a:rPr lang="en-US" dirty="0" smtClean="0"/>
+              <a:t> </a:t>
+            </a:r>
+            <a:r>
+              <a:rPr lang="en-US" dirty="0" err="1" smtClean="0"/>
+              <a:t>lắp</a:t>
+            </a:r>
+            <a:r>
+              <a:rPr lang="en-US" dirty="0" smtClean="0"/>
+              <a:t> </a:t>
+            </a:r>
+            <a:r>
+              <a:rPr lang="en-US" dirty="0" err="1" smtClean="0"/>
+              <a:t>đặt</a:t>
+            </a:r>
+            <a:r>
+              <a:rPr lang="en-US" dirty="0" smtClean="0"/>
+              <a:t> </a:t>
+            </a:r>
+            <a:r>
+              <a:rPr lang="en-US" dirty="0" err="1" smtClean="0"/>
+              <a:t>hợp</a:t>
+            </a:r>
+            <a:r>
+              <a:rPr lang="en-US" dirty="0" smtClean="0"/>
+              <a:t> </a:t>
+            </a:r>
+            <a:r>
+              <a:rPr lang="en-US" dirty="0" err="1" smtClean="0"/>
+              <a:t>lý</a:t>
+            </a:r>
+            <a:endParaRPr lang="en-US" dirty="0"/>
+          </a:p>
+        </p:txBody>
+      </p:sp>
+    </p:spTree>
+    <p:extLst>
+      <p:ext uri="{BB962C8B-B14F-4D97-AF65-F5344CB8AC3E}">
+        <p14:creationId xmlns:p14="http://schemas.microsoft.com/office/powerpoint/2010/main" val="1949196504"/>
       </p:ext>
     </p:extLst>
   </p:cSld>

</xml_diff>

<commit_message>
update draw daynight function
</commit_message>
<xml_diff>
--- a/report/Timeline.Report.pptx
+++ b/report/Timeline.Report.pptx
@@ -318,7 +318,7 @@
             <a:fld id="{1D8BD707-D9CF-40AE-B4C6-C98DA3205C09}" type="datetimeFigureOut">
               <a:rPr lang="en-US" smtClean="0"/>
               <a:pPr/>
-              <a:t>5/11/2020</a:t>
+              <a:t>5/12/2020</a:t>
             </a:fld>
             <a:endParaRPr lang="en-US"/>
           </a:p>
@@ -485,7 +485,7 @@
             <a:fld id="{1D8BD707-D9CF-40AE-B4C6-C98DA3205C09}" type="datetimeFigureOut">
               <a:rPr lang="en-US" smtClean="0"/>
               <a:pPr/>
-              <a:t>5/11/2020</a:t>
+              <a:t>5/12/2020</a:t>
             </a:fld>
             <a:endParaRPr lang="en-US"/>
           </a:p>
@@ -662,7 +662,7 @@
             <a:fld id="{1D8BD707-D9CF-40AE-B4C6-C98DA3205C09}" type="datetimeFigureOut">
               <a:rPr lang="en-US" smtClean="0"/>
               <a:pPr/>
-              <a:t>5/11/2020</a:t>
+              <a:t>5/12/2020</a:t>
             </a:fld>
             <a:endParaRPr lang="en-US"/>
           </a:p>
@@ -829,7 +829,7 @@
             <a:fld id="{1D8BD707-D9CF-40AE-B4C6-C98DA3205C09}" type="datetimeFigureOut">
               <a:rPr lang="en-US" smtClean="0"/>
               <a:pPr/>
-              <a:t>5/11/2020</a:t>
+              <a:t>5/12/2020</a:t>
             </a:fld>
             <a:endParaRPr lang="en-US"/>
           </a:p>
@@ -1072,7 +1072,7 @@
             <a:fld id="{1D8BD707-D9CF-40AE-B4C6-C98DA3205C09}" type="datetimeFigureOut">
               <a:rPr lang="en-US" smtClean="0"/>
               <a:pPr/>
-              <a:t>5/11/2020</a:t>
+              <a:t>5/12/2020</a:t>
             </a:fld>
             <a:endParaRPr lang="en-US"/>
           </a:p>
@@ -1357,7 +1357,7 @@
             <a:fld id="{1D8BD707-D9CF-40AE-B4C6-C98DA3205C09}" type="datetimeFigureOut">
               <a:rPr lang="en-US" smtClean="0"/>
               <a:pPr/>
-              <a:t>5/11/2020</a:t>
+              <a:t>5/12/2020</a:t>
             </a:fld>
             <a:endParaRPr lang="en-US"/>
           </a:p>
@@ -1776,7 +1776,7 @@
             <a:fld id="{1D8BD707-D9CF-40AE-B4C6-C98DA3205C09}" type="datetimeFigureOut">
               <a:rPr lang="en-US" smtClean="0"/>
               <a:pPr/>
-              <a:t>5/11/2020</a:t>
+              <a:t>5/12/2020</a:t>
             </a:fld>
             <a:endParaRPr lang="en-US"/>
           </a:p>
@@ -1891,7 +1891,7 @@
             <a:fld id="{1D8BD707-D9CF-40AE-B4C6-C98DA3205C09}" type="datetimeFigureOut">
               <a:rPr lang="en-US" smtClean="0"/>
               <a:pPr/>
-              <a:t>5/11/2020</a:t>
+              <a:t>5/12/2020</a:t>
             </a:fld>
             <a:endParaRPr lang="en-US"/>
           </a:p>
@@ -1983,7 +1983,7 @@
             <a:fld id="{1D8BD707-D9CF-40AE-B4C6-C98DA3205C09}" type="datetimeFigureOut">
               <a:rPr lang="en-US" smtClean="0"/>
               <a:pPr/>
-              <a:t>5/11/2020</a:t>
+              <a:t>5/12/2020</a:t>
             </a:fld>
             <a:endParaRPr lang="en-US"/>
           </a:p>
@@ -2257,7 +2257,7 @@
             <a:fld id="{1D8BD707-D9CF-40AE-B4C6-C98DA3205C09}" type="datetimeFigureOut">
               <a:rPr lang="en-US" smtClean="0"/>
               <a:pPr/>
-              <a:t>5/11/2020</a:t>
+              <a:t>5/12/2020</a:t>
             </a:fld>
             <a:endParaRPr lang="en-US"/>
           </a:p>
@@ -2507,7 +2507,7 @@
             <a:fld id="{1D8BD707-D9CF-40AE-B4C6-C98DA3205C09}" type="datetimeFigureOut">
               <a:rPr lang="en-US" smtClean="0"/>
               <a:pPr/>
-              <a:t>5/11/2020</a:t>
+              <a:t>5/12/2020</a:t>
             </a:fld>
             <a:endParaRPr lang="en-US"/>
           </a:p>
@@ -2717,7 +2717,7 @@
             <a:fld id="{1D8BD707-D9CF-40AE-B4C6-C98DA3205C09}" type="datetimeFigureOut">
               <a:rPr lang="en-US" smtClean="0"/>
               <a:pPr/>
-              <a:t>5/11/2020</a:t>
+              <a:t>5/12/2020</a:t>
             </a:fld>
             <a:endParaRPr lang="en-US"/>
           </a:p>
@@ -6033,11 +6033,7 @@
             </a:r>
             <a:r>
               <a:rPr lang="en-US" sz="2000" dirty="0" smtClean="0"/>
-              <a:t> </a:t>
-            </a:r>
-            <a:r>
-              <a:rPr lang="en-US" sz="2000" dirty="0" smtClean="0"/>
-              <a:t>Exponent TAG59</a:t>
+              <a:t> Exponent TAG59</a:t>
             </a:r>
           </a:p>
         </p:txBody>
@@ -6275,11 +6271,7 @@
             </a:r>
             <a:r>
               <a:rPr lang="en-US" sz="2000" dirty="0" smtClean="0"/>
-              <a:t> </a:t>
-            </a:r>
-            <a:r>
-              <a:rPr lang="en-US" sz="2000" dirty="0" smtClean="0"/>
-              <a:t>Exponent TAG93</a:t>
+              <a:t> Exponent TAG93</a:t>
             </a:r>
           </a:p>
         </p:txBody>
@@ -6517,11 +6509,7 @@
             </a:r>
             <a:r>
               <a:rPr lang="en-US" sz="2000" dirty="0" smtClean="0"/>
-              <a:t> </a:t>
-            </a:r>
-            <a:r>
-              <a:rPr lang="en-US" sz="2000" dirty="0" smtClean="0"/>
-              <a:t>Exponent TAGC2</a:t>
+              <a:t> Exponent TAGC2</a:t>
             </a:r>
           </a:p>
         </p:txBody>
@@ -6759,11 +6747,7 @@
             </a:r>
             <a:r>
               <a:rPr lang="en-US" sz="2000" dirty="0" smtClean="0"/>
-              <a:t> </a:t>
-            </a:r>
-            <a:r>
-              <a:rPr lang="en-US" sz="2000" dirty="0" smtClean="0"/>
-              <a:t>Exponent TAGC0</a:t>
+              <a:t> Exponent TAGC0</a:t>
             </a:r>
           </a:p>
         </p:txBody>
@@ -11081,62 +11065,6 @@
           </a:p>
         </p:txBody>
       </p:sp>
-      <p:pic>
-        <p:nvPicPr>
-          <p:cNvPr id="1026" name="Picture 2"/>
-          <p:cNvPicPr>
-            <a:picLocks noGrp="1" noChangeAspect="1" noChangeArrowheads="1"/>
-          </p:cNvPicPr>
-          <p:nvPr>
-            <p:ph idx="1"/>
-          </p:nvPr>
-        </p:nvPicPr>
-        <p:blipFill>
-          <a:blip r:embed="rId2">
-            <a:extLst>
-              <a:ext uri="{28A0092B-C50C-407E-A947-70E740481C1C}">
-                <a14:useLocalDpi xmlns:a14="http://schemas.microsoft.com/office/drawing/2010/main" val="0"/>
-              </a:ext>
-            </a:extLst>
-          </a:blip>
-          <a:srcRect/>
-          <a:stretch>
-            <a:fillRect/>
-          </a:stretch>
-        </p:blipFill>
-        <p:spPr bwMode="auto">
-          <a:xfrm>
-            <a:off x="2290129" y="1600200"/>
-            <a:ext cx="4563742" cy="4525963"/>
-          </a:xfrm>
-          <a:prstGeom prst="rect">
-            <a:avLst/>
-          </a:prstGeom>
-          <a:noFill/>
-          <a:ln>
-            <a:noFill/>
-          </a:ln>
-          <a:extLst>
-            <a:ext uri="{909E8E84-426E-40DD-AFC4-6F175D3DCCD1}">
-              <a14:hiddenFill xmlns:a14="http://schemas.microsoft.com/office/drawing/2010/main">
-                <a:solidFill>
-                  <a:schemeClr val="accent1"/>
-                </a:solidFill>
-              </a14:hiddenFill>
-            </a:ext>
-            <a:ext uri="{91240B29-F687-4F45-9708-019B960494DF}">
-              <a14:hiddenLine xmlns:a14="http://schemas.microsoft.com/office/drawing/2010/main" w="9525">
-                <a:solidFill>
-                  <a:schemeClr val="tx1"/>
-                </a:solidFill>
-                <a:miter lim="800000"/>
-                <a:headEnd/>
-                <a:tailEnd/>
-              </a14:hiddenLine>
-            </a:ext>
-          </a:extLst>
-        </p:spPr>
-      </p:pic>
       <p:sp>
         <p:nvSpPr>
           <p:cNvPr id="5" name="Title 1"/>
@@ -11202,6 +11130,119 @@
             <a:r>
               <a:rPr lang="en-US" sz="2000" dirty="0" err="1" smtClean="0"/>
               <a:t>thống</a:t>
+            </a:r>
+            <a:endParaRPr lang="en-US" sz="2000" dirty="0"/>
+          </a:p>
+        </p:txBody>
+      </p:sp>
+      <p:pic>
+        <p:nvPicPr>
+          <p:cNvPr id="4" name="Picture 2" descr="F:\thuc_tap\BLE_matlab\report\Capture.PNG"/>
+          <p:cNvPicPr>
+            <a:picLocks noChangeAspect="1" noChangeArrowheads="1"/>
+          </p:cNvPicPr>
+          <p:nvPr/>
+        </p:nvPicPr>
+        <p:blipFill>
+          <a:blip r:embed="rId2">
+            <a:extLst>
+              <a:ext uri="{28A0092B-C50C-407E-A947-70E740481C1C}">
+                <a14:useLocalDpi xmlns:a14="http://schemas.microsoft.com/office/drawing/2010/main" val="0"/>
+              </a:ext>
+            </a:extLst>
+          </a:blip>
+          <a:srcRect/>
+          <a:stretch>
+            <a:fillRect/>
+          </a:stretch>
+        </p:blipFill>
+        <p:spPr bwMode="auto">
+          <a:xfrm>
+            <a:off x="1575054" y="1295400"/>
+            <a:ext cx="6146292" cy="4724400"/>
+          </a:xfrm>
+          <a:prstGeom prst="rect">
+            <a:avLst/>
+          </a:prstGeom>
+          <a:noFill/>
+          <a:extLst>
+            <a:ext uri="{909E8E84-426E-40DD-AFC4-6F175D3DCCD1}">
+              <a14:hiddenFill xmlns:a14="http://schemas.microsoft.com/office/drawing/2010/main">
+                <a:solidFill>
+                  <a:srgbClr val="FFFFFF"/>
+                </a:solidFill>
+              </a14:hiddenFill>
+            </a:ext>
+          </a:extLst>
+        </p:spPr>
+      </p:pic>
+      <p:sp>
+        <p:nvSpPr>
+          <p:cNvPr id="7" name="Title 1"/>
+          <p:cNvSpPr txBox="1">
+            <a:spLocks/>
+          </p:cNvSpPr>
+          <p:nvPr/>
+        </p:nvSpPr>
+        <p:spPr>
+          <a:xfrm>
+            <a:off x="6172200" y="2667000"/>
+            <a:ext cx="2743200" cy="1143000"/>
+          </a:xfrm>
+          <a:prstGeom prst="rect">
+            <a:avLst/>
+          </a:prstGeom>
+        </p:spPr>
+        <p:txBody>
+          <a:bodyPr vert="horz" lIns="91440" tIns="45720" rIns="91440" bIns="45720" rtlCol="0" anchor="ctr">
+            <a:normAutofit fontScale="92500" lnSpcReduction="10000"/>
+          </a:bodyPr>
+          <a:lstStyle>
+            <a:lvl1pPr algn="ctr" defTabSz="914400" rtl="0" eaLnBrk="1" latinLnBrk="0" hangingPunct="1">
+              <a:spcBef>
+                <a:spcPct val="0"/>
+              </a:spcBef>
+              <a:buNone/>
+              <a:defRPr sz="4400" kern="1200">
+                <a:solidFill>
+                  <a:schemeClr val="tx1"/>
+                </a:solidFill>
+                <a:latin typeface="+mj-lt"/>
+                <a:ea typeface="+mj-ea"/>
+                <a:cs typeface="+mj-cs"/>
+              </a:defRPr>
+            </a:lvl1pPr>
+          </a:lstStyle>
+          <a:p>
+            <a:pPr algn="l"/>
+            <a:r>
+              <a:rPr lang="en-US" sz="2000" dirty="0" smtClean="0"/>
+              <a:t>B: Beacon</a:t>
+            </a:r>
+          </a:p>
+          <a:p>
+            <a:pPr algn="l"/>
+            <a:r>
+              <a:rPr lang="en-US" sz="2000" dirty="0" smtClean="0"/>
+              <a:t>M: Gateway</a:t>
+            </a:r>
+          </a:p>
+          <a:p>
+            <a:pPr algn="l"/>
+            <a:r>
+              <a:rPr lang="en-US" sz="2000" dirty="0" smtClean="0"/>
+              <a:t>N: Tag</a:t>
+            </a:r>
+          </a:p>
+          <a:p>
+            <a:pPr algn="l"/>
+            <a:r>
+              <a:rPr lang="en-US" sz="2000" dirty="0" smtClean="0"/>
+              <a:t>P: </a:t>
+            </a:r>
+            <a:r>
+              <a:rPr lang="en-US" sz="2000" dirty="0" err="1" smtClean="0"/>
+              <a:t>Pathloss</a:t>
             </a:r>
             <a:endParaRPr lang="en-US" sz="2000" dirty="0"/>
           </a:p>
@@ -12073,7 +12114,12 @@
             <p:ph type="title"/>
           </p:nvPr>
         </p:nvSpPr>
-        <p:spPr/>
+        <p:spPr>
+          <a:xfrm>
+            <a:off x="381000" y="609600"/>
+            <a:ext cx="8229600" cy="1143000"/>
+          </a:xfrm>
+        </p:spPr>
         <p:txBody>
           <a:bodyPr/>
           <a:lstStyle/>
@@ -12086,8 +12132,8 @@
           </a:p>
         </p:txBody>
       </p:sp>
-      <mc:AlternateContent xmlns:mc="http://schemas.openxmlformats.org/markup-compatibility/2006" xmlns:a14="http://schemas.microsoft.com/office/drawing/2010/main">
-        <mc:Choice Requires="a14">
+      <mc:AlternateContent xmlns:mc="http://schemas.openxmlformats.org/markup-compatibility/2006">
+        <mc:Choice xmlns:a14="http://schemas.microsoft.com/office/drawing/2010/main" Requires="a14">
           <p:sp>
             <p:nvSpPr>
               <p:cNvPr id="3" name="Content Placeholder 2"/>
@@ -12098,10 +12144,15 @@
                 <p:ph idx="1"/>
               </p:nvPr>
             </p:nvSpPr>
-            <p:spPr/>
+            <p:spPr>
+              <a:xfrm>
+                <a:off x="152400" y="1905000"/>
+                <a:ext cx="8991600" cy="4343400"/>
+              </a:xfrm>
+            </p:spPr>
             <p:txBody>
               <a:bodyPr>
-                <a:normAutofit lnSpcReduction="10000"/>
+                <a:normAutofit fontScale="85000" lnSpcReduction="20000"/>
               </a:bodyPr>
               <a:lstStyle/>
               <a:p>
@@ -12110,7 +12161,7 @@
                   <a:buChar char="-"/>
                 </a:pPr>
                 <a:r>
-                  <a:rPr lang="en-US" dirty="0" err="1" smtClean="0"/>
+                  <a:rPr lang="en-US" dirty="0" smtClean="0"/>
                   <a:t>Thiết</a:t>
                 </a:r>
                 <a:r>
@@ -12123,7 +12174,11 @@
                 </a:r>
                 <a:r>
                   <a:rPr lang="en-US" dirty="0" smtClean="0"/>
-                  <a:t>: Gateway</a:t>
+                  <a:t>: </a:t>
+                </a:r>
+                <a:r>
+                  <a:rPr lang="en-US" dirty="0" smtClean="0"/>
+                  <a:t>Gateway</a:t>
                 </a:r>
               </a:p>
               <a:p>
@@ -12188,13 +12243,236 @@
                 </a:r>
                 <a:r>
                   <a:rPr lang="en-US" dirty="0" smtClean="0"/>
-                  <a:t> mean.</a:t>
+                  <a:t> mean</a:t>
+                </a:r>
+                <a:r>
+                  <a:rPr lang="en-US" dirty="0" smtClean="0"/>
+                  <a:t>.</a:t>
                 </a:r>
               </a:p>
               <a:p>
-                <a:pPr algn="just">
-                  <a:buFontTx/>
-                  <a:buChar char="-"/>
+                <a:pPr marL="0" indent="0" algn="just">
+                  <a:buNone/>
+                </a:pPr>
+                <a14:m>
+                  <m:oMathPara xmlns:m="http://schemas.openxmlformats.org/officeDocument/2006/math">
+                    <m:oMathParaPr>
+                      <m:jc m:val="centerGroup"/>
+                    </m:oMathParaPr>
+                    <m:oMath xmlns:m="http://schemas.openxmlformats.org/officeDocument/2006/math">
+                      <m:sSub>
+                        <m:sSubPr>
+                          <m:ctrlPr>
+                            <a:rPr lang="en-US" i="1">
+                              <a:latin typeface="Cambria Math"/>
+                            </a:rPr>
+                          </m:ctrlPr>
+                        </m:sSubPr>
+                        <m:e>
+                          <m:r>
+                            <a:rPr lang="en-US" i="1">
+                              <a:latin typeface="Cambria Math"/>
+                            </a:rPr>
+                            <m:t>𝑅𝑔</m:t>
+                          </m:r>
+                          <m:sSub>
+                            <m:sSubPr>
+                              <m:ctrlPr>
+                                <a:rPr lang="en-US" i="1">
+                                  <a:latin typeface="Cambria Math"/>
+                                </a:rPr>
+                              </m:ctrlPr>
+                            </m:sSubPr>
+                            <m:e>
+                              <m:r>
+                                <a:rPr lang="en-US" i="1">
+                                  <a:latin typeface="Cambria Math"/>
+                                </a:rPr>
+                                <m:t>𝑤</m:t>
+                              </m:r>
+                            </m:e>
+                            <m:sub>
+                              <m:r>
+                                <a:rPr lang="en-US" i="1">
+                                  <a:latin typeface="Cambria Math"/>
+                                </a:rPr>
+                                <m:t>𝑚𝑒𝑎𝑛</m:t>
+                              </m:r>
+                            </m:sub>
+                          </m:sSub>
+                        </m:e>
+                        <m:sub>
+                          <m:r>
+                            <a:rPr lang="en-US" i="1">
+                              <a:latin typeface="Cambria Math"/>
+                            </a:rPr>
+                            <m:t>𝑖</m:t>
+                          </m:r>
+                        </m:sub>
+                      </m:sSub>
+                      <m:r>
+                        <a:rPr lang="en-US" b="0" i="1" smtClean="0">
+                          <a:latin typeface="Cambria Math"/>
+                        </a:rPr>
+                        <m:t>=</m:t>
+                      </m:r>
+                      <m:f>
+                        <m:fPr>
+                          <m:ctrlPr>
+                            <a:rPr lang="en-US" i="1" smtClean="0">
+                              <a:latin typeface="Cambria Math"/>
+                            </a:rPr>
+                          </m:ctrlPr>
+                        </m:fPr>
+                        <m:num>
+                          <m:sSub>
+                            <m:sSubPr>
+                              <m:ctrlPr>
+                                <a:rPr lang="en-US" i="1">
+                                  <a:latin typeface="Cambria Math"/>
+                                </a:rPr>
+                              </m:ctrlPr>
+                            </m:sSubPr>
+                            <m:e>
+                              <m:r>
+                                <a:rPr lang="en-US" i="1">
+                                  <a:latin typeface="Cambria Math"/>
+                                </a:rPr>
+                                <m:t>𝑅𝑔𝑤</m:t>
+                              </m:r>
+                            </m:e>
+                            <m:sub>
+                              <m:r>
+                                <a:rPr lang="en-US" b="0" i="1" smtClean="0">
+                                  <a:latin typeface="Cambria Math"/>
+                                </a:rPr>
+                                <m:t>1</m:t>
+                              </m:r>
+                            </m:sub>
+                          </m:sSub>
+                          <m:r>
+                            <a:rPr lang="en-US" b="0" i="1" smtClean="0">
+                              <a:latin typeface="Cambria Math"/>
+                            </a:rPr>
+                            <m:t>+</m:t>
+                          </m:r>
+                          <m:sSub>
+                            <m:sSubPr>
+                              <m:ctrlPr>
+                                <a:rPr lang="en-US" i="1">
+                                  <a:latin typeface="Cambria Math"/>
+                                </a:rPr>
+                              </m:ctrlPr>
+                            </m:sSubPr>
+                            <m:e>
+                              <m:r>
+                                <a:rPr lang="en-US" i="1">
+                                  <a:latin typeface="Cambria Math"/>
+                                </a:rPr>
+                                <m:t>𝑅𝑔𝑤</m:t>
+                              </m:r>
+                            </m:e>
+                            <m:sub>
+                              <m:r>
+                                <a:rPr lang="en-US" b="0" i="1" smtClean="0">
+                                  <a:latin typeface="Cambria Math"/>
+                                </a:rPr>
+                                <m:t>2</m:t>
+                              </m:r>
+                            </m:sub>
+                          </m:sSub>
+                          <m:r>
+                            <a:rPr lang="en-US" b="0" i="1" smtClean="0">
+                              <a:latin typeface="Cambria Math"/>
+                            </a:rPr>
+                            <m:t>+…+</m:t>
+                          </m:r>
+                          <m:sSub>
+                            <m:sSubPr>
+                              <m:ctrlPr>
+                                <a:rPr lang="en-US" i="1">
+                                  <a:latin typeface="Cambria Math"/>
+                                </a:rPr>
+                              </m:ctrlPr>
+                            </m:sSubPr>
+                            <m:e>
+                              <m:r>
+                                <a:rPr lang="en-US" i="1">
+                                  <a:latin typeface="Cambria Math"/>
+                                </a:rPr>
+                                <m:t>𝑅𝑔𝑤</m:t>
+                              </m:r>
+                            </m:e>
+                            <m:sub>
+                              <m:r>
+                                <a:rPr lang="en-US" b="0" i="1" smtClean="0">
+                                  <a:latin typeface="Cambria Math"/>
+                                </a:rPr>
+                                <m:t>𝑖</m:t>
+                              </m:r>
+                              <m:r>
+                                <a:rPr lang="en-US" b="0" i="1" smtClean="0">
+                                  <a:latin typeface="Cambria Math"/>
+                                </a:rPr>
+                                <m:t>−1</m:t>
+                              </m:r>
+                            </m:sub>
+                          </m:sSub>
+                          <m:r>
+                            <a:rPr lang="en-US" b="0" i="1" smtClean="0">
+                              <a:latin typeface="Cambria Math"/>
+                            </a:rPr>
+                            <m:t>+</m:t>
+                          </m:r>
+                          <m:sSub>
+                            <m:sSubPr>
+                              <m:ctrlPr>
+                                <a:rPr lang="en-US" i="1">
+                                  <a:latin typeface="Cambria Math"/>
+                                </a:rPr>
+                              </m:ctrlPr>
+                            </m:sSubPr>
+                            <m:e>
+                              <m:r>
+                                <a:rPr lang="en-US" i="1">
+                                  <a:latin typeface="Cambria Math"/>
+                                </a:rPr>
+                                <m:t>𝑅𝑔𝑤</m:t>
+                              </m:r>
+                            </m:e>
+                            <m:sub>
+                              <m:r>
+                                <a:rPr lang="en-US" b="0" i="1" smtClean="0">
+                                  <a:latin typeface="Cambria Math"/>
+                                </a:rPr>
+                                <m:t>𝑖</m:t>
+                              </m:r>
+                              <m:r>
+                                <a:rPr lang="en-US" b="0" i="1" smtClean="0">
+                                  <a:latin typeface="Cambria Math"/>
+                                </a:rPr>
+                                <m:t>+1</m:t>
+                              </m:r>
+                            </m:sub>
+                          </m:sSub>
+                        </m:num>
+                        <m:den>
+                          <m:r>
+                            <a:rPr lang="en-US" b="0" i="1" smtClean="0">
+                              <a:latin typeface="Cambria Math"/>
+                            </a:rPr>
+                            <m:t>𝑖</m:t>
+                          </m:r>
+                        </m:den>
+                      </m:f>
+                    </m:oMath>
+                  </m:oMathPara>
+                </a14:m>
+                <a:endParaRPr lang="en-US" dirty="0" smtClean="0"/>
+              </a:p>
+              <a:p>
+                <a:pPr marL="0" indent="0" algn="just">
+                  <a:buNone/>
                 </a:pPr>
                 <a:endParaRPr lang="en-US" dirty="0" smtClean="0"/>
               </a:p>
@@ -12205,7 +12483,19 @@
                 </a:pPr>
                 <a:r>
                   <a:rPr lang="en-US" dirty="0" smtClean="0"/>
-                  <a:t>RSSI Tag </a:t>
+                  <a:t>RSSI </a:t>
+                </a:r>
+                <a:r>
+                  <a:rPr lang="en-US" dirty="0" smtClean="0"/>
+                  <a:t>Tag, </a:t>
+                </a:r>
+                <a:r>
+                  <a:rPr lang="en-US" dirty="0" err="1" smtClean="0"/>
+                  <a:t>Pathloss</a:t>
+                </a:r>
+                <a:r>
+                  <a:rPr lang="en-US" dirty="0" smtClean="0"/>
+                  <a:t> </a:t>
                 </a:r>
                 <a:r>
                   <a:rPr lang="en-US" dirty="0" err="1" smtClean="0"/>
@@ -12439,8 +12729,20 @@
                   <a:t>-   </a:t>
                 </a:r>
                 <a:r>
+                  <a:rPr lang="en-US" dirty="0" smtClean="0"/>
+                  <a:t>Sau </a:t>
+                </a:r>
+                <a:r>
                   <a:rPr lang="en-US" dirty="0" err="1" smtClean="0"/>
-                  <a:t>Áp</a:t>
+                  <a:t>đó</a:t>
+                </a:r>
+                <a:r>
+                  <a:rPr lang="en-US" dirty="0" smtClean="0"/>
+                  <a:t>, </a:t>
+                </a:r>
+                <a:r>
+                  <a:rPr lang="en-US" dirty="0" err="1" smtClean="0"/>
+                  <a:t>áp</a:t>
                 </a:r>
                 <a:r>
                   <a:rPr lang="en-US" dirty="0" smtClean="0"/>
@@ -12472,7 +12774,7 @@
             </p:txBody>
           </p:sp>
         </mc:Choice>
-        <mc:Fallback xmlns="">
+        <mc:Fallback>
           <p:sp>
             <p:nvSpPr>
               <p:cNvPr id="3" name="Content Placeholder 2"/>
@@ -12484,10 +12786,14 @@
               </p:nvPr>
             </p:nvSpPr>
             <p:spPr>
+              <a:xfrm>
+                <a:off x="152400" y="1905000"/>
+                <a:ext cx="8991600" cy="4343400"/>
+              </a:xfrm>
               <a:blipFill rotWithShape="1">
                 <a:blip r:embed="rId2"/>
                 <a:stretch>
-                  <a:fillRect l="-1926" t="-3100"/>
+                  <a:fillRect l="-1288" t="-3090"/>
                 </a:stretch>
               </a:blipFill>
             </p:spPr>

</xml_diff>